<commit_message>
Updated code and presentation
</commit_message>
<xml_diff>
--- a/mobile_price_classification_presentation.pptx
+++ b/mobile_price_classification_presentation.pptx
@@ -171,7 +171,7 @@
           <a:noFill/>
           <a:extLst>
             <a:ext uri="{909E8E84-426E-40dd-AFC4-6F175D3DCCD1}">
-              <a14:hiddenFill xmlns:a14="http://schemas.microsoft.com/office/drawing/2010/main" xmlns="">
+              <a14:hiddenFill xmlns="" xmlns:a14="http://schemas.microsoft.com/office/drawing/2010/main">
                 <a:solidFill>
                   <a:srgbClr val="FFFFFF"/>
                 </a:solidFill>
@@ -231,7 +231,7 @@
             </a:ln>
             <a:extLst>
               <a:ext uri="{91240B29-F687-4f45-9708-019B960494DF}">
-                <a14:hiddenLine xmlns:a14="http://schemas.microsoft.com/office/drawing/2010/main" xmlns="" w="9525">
+                <a14:hiddenLine xmlns="" xmlns:a14="http://schemas.microsoft.com/office/drawing/2010/main" w="9525">
                   <a:solidFill>
                     <a:srgbClr val="000000"/>
                   </a:solidFill>
@@ -321,7 +321,7 @@
             </a:ln>
             <a:extLst>
               <a:ext uri="{91240B29-F687-4f45-9708-019B960494DF}">
-                <a14:hiddenLine xmlns:a14="http://schemas.microsoft.com/office/drawing/2010/main" xmlns="" w="9525">
+                <a14:hiddenLine xmlns="" xmlns:a14="http://schemas.microsoft.com/office/drawing/2010/main" w="9525">
                   <a:solidFill>
                     <a:srgbClr val="000000"/>
                   </a:solidFill>
@@ -411,7 +411,7 @@
             </a:ln>
             <a:extLst>
               <a:ext uri="{91240B29-F687-4f45-9708-019B960494DF}">
-                <a14:hiddenLine xmlns:a14="http://schemas.microsoft.com/office/drawing/2010/main" xmlns="" w="9525">
+                <a14:hiddenLine xmlns="" xmlns:a14="http://schemas.microsoft.com/office/drawing/2010/main" w="9525">
                   <a:solidFill>
                     <a:srgbClr val="000000"/>
                   </a:solidFill>
@@ -445,7 +445,7 @@
             </a:ln>
             <a:extLst>
               <a:ext uri="{91240B29-F687-4f45-9708-019B960494DF}">
-                <a14:hiddenLine xmlns:a14="http://schemas.microsoft.com/office/drawing/2010/main" xmlns="" w="9525">
+                <a14:hiddenLine xmlns="" xmlns:a14="http://schemas.microsoft.com/office/drawing/2010/main" w="9525">
                   <a:solidFill>
                     <a:srgbClr val="000000"/>
                   </a:solidFill>
@@ -535,7 +535,7 @@
             </a:ln>
             <a:extLst>
               <a:ext uri="{91240B29-F687-4f45-9708-019B960494DF}">
-                <a14:hiddenLine xmlns:a14="http://schemas.microsoft.com/office/drawing/2010/main" xmlns="" w="9525">
+                <a14:hiddenLine xmlns="" xmlns:a14="http://schemas.microsoft.com/office/drawing/2010/main" w="9525">
                   <a:solidFill>
                     <a:srgbClr val="000000"/>
                   </a:solidFill>
@@ -597,7 +597,7 @@
             </a:ln>
             <a:extLst>
               <a:ext uri="{91240B29-F687-4f45-9708-019B960494DF}">
-                <a14:hiddenLine xmlns:a14="http://schemas.microsoft.com/office/drawing/2010/main" xmlns="" w="9525">
+                <a14:hiddenLine xmlns="" xmlns:a14="http://schemas.microsoft.com/office/drawing/2010/main" w="9525">
                   <a:solidFill>
                     <a:srgbClr val="000000"/>
                   </a:solidFill>
@@ -659,7 +659,7 @@
             </a:ln>
             <a:extLst>
               <a:ext uri="{91240B29-F687-4f45-9708-019B960494DF}">
-                <a14:hiddenLine xmlns:a14="http://schemas.microsoft.com/office/drawing/2010/main" xmlns="" w="9525">
+                <a14:hiddenLine xmlns="" xmlns:a14="http://schemas.microsoft.com/office/drawing/2010/main" w="9525">
                   <a:solidFill>
                     <a:srgbClr val="000000"/>
                   </a:solidFill>
@@ -749,7 +749,7 @@
             </a:ln>
             <a:extLst>
               <a:ext uri="{91240B29-F687-4f45-9708-019B960494DF}">
-                <a14:hiddenLine xmlns:a14="http://schemas.microsoft.com/office/drawing/2010/main" xmlns="" w="9525">
+                <a14:hiddenLine xmlns="" xmlns:a14="http://schemas.microsoft.com/office/drawing/2010/main" w="9525">
                   <a:solidFill>
                     <a:srgbClr val="000000"/>
                   </a:solidFill>
@@ -811,7 +811,7 @@
             </a:ln>
             <a:extLst>
               <a:ext uri="{91240B29-F687-4f45-9708-019B960494DF}">
-                <a14:hiddenLine xmlns:a14="http://schemas.microsoft.com/office/drawing/2010/main" xmlns="" w="9525">
+                <a14:hiddenLine xmlns="" xmlns:a14="http://schemas.microsoft.com/office/drawing/2010/main" w="9525">
                   <a:solidFill>
                     <a:srgbClr val="000000"/>
                   </a:solidFill>
@@ -873,7 +873,7 @@
             </a:ln>
             <a:extLst>
               <a:ext uri="{91240B29-F687-4f45-9708-019B960494DF}">
-                <a14:hiddenLine xmlns:a14="http://schemas.microsoft.com/office/drawing/2010/main" xmlns="" w="9525">
+                <a14:hiddenLine xmlns="" xmlns:a14="http://schemas.microsoft.com/office/drawing/2010/main" w="9525">
                   <a:solidFill>
                     <a:srgbClr val="000000"/>
                   </a:solidFill>
@@ -963,7 +963,7 @@
             </a:ln>
             <a:extLst>
               <a:ext uri="{91240B29-F687-4f45-9708-019B960494DF}">
-                <a14:hiddenLine xmlns:a14="http://schemas.microsoft.com/office/drawing/2010/main" xmlns="" w="9525">
+                <a14:hiddenLine xmlns="" xmlns:a14="http://schemas.microsoft.com/office/drawing/2010/main" w="9525">
                   <a:solidFill>
                     <a:srgbClr val="000000"/>
                   </a:solidFill>
@@ -1053,7 +1053,7 @@
             </a:ln>
             <a:extLst>
               <a:ext uri="{91240B29-F687-4f45-9708-019B960494DF}">
-                <a14:hiddenLine xmlns:a14="http://schemas.microsoft.com/office/drawing/2010/main" xmlns="" w="9525">
+                <a14:hiddenLine xmlns="" xmlns:a14="http://schemas.microsoft.com/office/drawing/2010/main" w="9525">
                   <a:solidFill>
                     <a:srgbClr val="000000"/>
                   </a:solidFill>
@@ -1115,7 +1115,7 @@
             </a:ln>
             <a:extLst>
               <a:ext uri="{91240B29-F687-4f45-9708-019B960494DF}">
-                <a14:hiddenLine xmlns:a14="http://schemas.microsoft.com/office/drawing/2010/main" xmlns="" w="9525">
+                <a14:hiddenLine xmlns="" xmlns:a14="http://schemas.microsoft.com/office/drawing/2010/main" w="9525">
                   <a:solidFill>
                     <a:srgbClr val="000000"/>
                   </a:solidFill>
@@ -1225,7 +1225,7 @@
             </a:ln>
             <a:extLst>
               <a:ext uri="{91240B29-F687-4f45-9708-019B960494DF}">
-                <a14:hiddenLine xmlns:a14="http://schemas.microsoft.com/office/drawing/2010/main" xmlns="" w="9525">
+                <a14:hiddenLine xmlns="" xmlns:a14="http://schemas.microsoft.com/office/drawing/2010/main" w="9525">
                   <a:solidFill>
                     <a:srgbClr val="000000"/>
                   </a:solidFill>
@@ -1287,7 +1287,7 @@
             </a:ln>
             <a:extLst>
               <a:ext uri="{91240B29-F687-4f45-9708-019B960494DF}">
-                <a14:hiddenLine xmlns:a14="http://schemas.microsoft.com/office/drawing/2010/main" xmlns="" w="9525">
+                <a14:hiddenLine xmlns="" xmlns:a14="http://schemas.microsoft.com/office/drawing/2010/main" w="9525">
                   <a:solidFill>
                     <a:srgbClr val="000000"/>
                   </a:solidFill>
@@ -1377,7 +1377,7 @@
             </a:ln>
             <a:extLst>
               <a:ext uri="{91240B29-F687-4f45-9708-019B960494DF}">
-                <a14:hiddenLine xmlns:a14="http://schemas.microsoft.com/office/drawing/2010/main" xmlns="" w="9525">
+                <a14:hiddenLine xmlns="" xmlns:a14="http://schemas.microsoft.com/office/drawing/2010/main" w="9525">
                   <a:solidFill>
                     <a:srgbClr val="000000"/>
                   </a:solidFill>
@@ -1467,7 +1467,7 @@
             </a:ln>
             <a:extLst>
               <a:ext uri="{91240B29-F687-4f45-9708-019B960494DF}">
-                <a14:hiddenLine xmlns:a14="http://schemas.microsoft.com/office/drawing/2010/main" xmlns="" w="9525">
+                <a14:hiddenLine xmlns="" xmlns:a14="http://schemas.microsoft.com/office/drawing/2010/main" w="9525">
                   <a:solidFill>
                     <a:srgbClr val="000000"/>
                   </a:solidFill>
@@ -1529,7 +1529,7 @@
             </a:ln>
             <a:extLst>
               <a:ext uri="{91240B29-F687-4f45-9708-019B960494DF}">
-                <a14:hiddenLine xmlns:a14="http://schemas.microsoft.com/office/drawing/2010/main" xmlns="" w="9525">
+                <a14:hiddenLine xmlns="" xmlns:a14="http://schemas.microsoft.com/office/drawing/2010/main" w="9525">
                   <a:solidFill>
                     <a:srgbClr val="000000"/>
                   </a:solidFill>
@@ -1619,7 +1619,7 @@
             </a:ln>
             <a:extLst>
               <a:ext uri="{91240B29-F687-4f45-9708-019B960494DF}">
-                <a14:hiddenLine xmlns:a14="http://schemas.microsoft.com/office/drawing/2010/main" xmlns="" w="9525">
+                <a14:hiddenLine xmlns="" xmlns:a14="http://schemas.microsoft.com/office/drawing/2010/main" w="9525">
                   <a:solidFill>
                     <a:srgbClr val="000000"/>
                   </a:solidFill>
@@ -1709,7 +1709,7 @@
             </a:ln>
             <a:extLst>
               <a:ext uri="{91240B29-F687-4f45-9708-019B960494DF}">
-                <a14:hiddenLine xmlns:a14="http://schemas.microsoft.com/office/drawing/2010/main" xmlns="" w="9525">
+                <a14:hiddenLine xmlns="" xmlns:a14="http://schemas.microsoft.com/office/drawing/2010/main" w="9525">
                   <a:solidFill>
                     <a:srgbClr val="000000"/>
                   </a:solidFill>
@@ -1765,7 +1765,7 @@
             </a:ln>
             <a:extLst>
               <a:ext uri="{91240B29-F687-4f45-9708-019B960494DF}">
-                <a14:hiddenLine xmlns:a14="http://schemas.microsoft.com/office/drawing/2010/main" xmlns="" w="9525">
+                <a14:hiddenLine xmlns="" xmlns:a14="http://schemas.microsoft.com/office/drawing/2010/main" w="9525">
                   <a:solidFill>
                     <a:srgbClr val="000000"/>
                   </a:solidFill>
@@ -1855,7 +1855,7 @@
             </a:ln>
             <a:extLst>
               <a:ext uri="{91240B29-F687-4f45-9708-019B960494DF}">
-                <a14:hiddenLine xmlns:a14="http://schemas.microsoft.com/office/drawing/2010/main" xmlns="" w="9525">
+                <a14:hiddenLine xmlns="" xmlns:a14="http://schemas.microsoft.com/office/drawing/2010/main" w="9525">
                   <a:solidFill>
                     <a:srgbClr val="000000"/>
                   </a:solidFill>
@@ -1911,7 +1911,7 @@
             </a:ln>
             <a:extLst>
               <a:ext uri="{91240B29-F687-4f45-9708-019B960494DF}">
-                <a14:hiddenLine xmlns:a14="http://schemas.microsoft.com/office/drawing/2010/main" xmlns="" w="9525">
+                <a14:hiddenLine xmlns="" xmlns:a14="http://schemas.microsoft.com/office/drawing/2010/main" w="9525">
                   <a:solidFill>
                     <a:srgbClr val="000000"/>
                   </a:solidFill>
@@ -2001,7 +2001,7 @@
             </a:ln>
             <a:extLst>
               <a:ext uri="{91240B29-F687-4f45-9708-019B960494DF}">
-                <a14:hiddenLine xmlns:a14="http://schemas.microsoft.com/office/drawing/2010/main" xmlns="" w="9525">
+                <a14:hiddenLine xmlns="" xmlns:a14="http://schemas.microsoft.com/office/drawing/2010/main" w="9525">
                   <a:solidFill>
                     <a:srgbClr val="000000"/>
                   </a:solidFill>
@@ -2069,7 +2069,7 @@
             </a:ln>
             <a:extLst>
               <a:ext uri="{91240B29-F687-4f45-9708-019B960494DF}">
-                <a14:hiddenLine xmlns:a14="http://schemas.microsoft.com/office/drawing/2010/main" xmlns="" w="9525">
+                <a14:hiddenLine xmlns="" xmlns:a14="http://schemas.microsoft.com/office/drawing/2010/main" w="9525">
                   <a:solidFill>
                     <a:srgbClr val="000000"/>
                   </a:solidFill>
@@ -2159,7 +2159,7 @@
             </a:ln>
             <a:extLst>
               <a:ext uri="{91240B29-F687-4f45-9708-019B960494DF}">
-                <a14:hiddenLine xmlns:a14="http://schemas.microsoft.com/office/drawing/2010/main" xmlns="" w="9525">
+                <a14:hiddenLine xmlns="" xmlns:a14="http://schemas.microsoft.com/office/drawing/2010/main" w="9525">
                   <a:solidFill>
                     <a:srgbClr val="000000"/>
                   </a:solidFill>
@@ -2227,7 +2227,7 @@
             </a:ln>
             <a:extLst>
               <a:ext uri="{91240B29-F687-4f45-9708-019B960494DF}">
-                <a14:hiddenLine xmlns:a14="http://schemas.microsoft.com/office/drawing/2010/main" xmlns="" w="9525">
+                <a14:hiddenLine xmlns="" xmlns:a14="http://schemas.microsoft.com/office/drawing/2010/main" w="9525">
                   <a:solidFill>
                     <a:srgbClr val="000000"/>
                   </a:solidFill>
@@ -2317,7 +2317,7 @@
             </a:ln>
             <a:extLst>
               <a:ext uri="{91240B29-F687-4f45-9708-019B960494DF}">
-                <a14:hiddenLine xmlns:a14="http://schemas.microsoft.com/office/drawing/2010/main" xmlns="" w="9525">
+                <a14:hiddenLine xmlns="" xmlns:a14="http://schemas.microsoft.com/office/drawing/2010/main" w="9525">
                   <a:solidFill>
                     <a:srgbClr val="000000"/>
                   </a:solidFill>
@@ -2351,7 +2351,7 @@
             </a:ln>
             <a:extLst>
               <a:ext uri="{91240B29-F687-4f45-9708-019B960494DF}">
-                <a14:hiddenLine xmlns:a14="http://schemas.microsoft.com/office/drawing/2010/main" xmlns="" w="9525">
+                <a14:hiddenLine xmlns="" xmlns:a14="http://schemas.microsoft.com/office/drawing/2010/main" w="9525">
                   <a:solidFill>
                     <a:srgbClr val="000000"/>
                   </a:solidFill>
@@ -2441,7 +2441,7 @@
             </a:ln>
             <a:extLst>
               <a:ext uri="{91240B29-F687-4f45-9708-019B960494DF}">
-                <a14:hiddenLine xmlns:a14="http://schemas.microsoft.com/office/drawing/2010/main" xmlns="" w="9525">
+                <a14:hiddenLine xmlns="" xmlns:a14="http://schemas.microsoft.com/office/drawing/2010/main" w="9525">
                   <a:solidFill>
                     <a:srgbClr val="000000"/>
                   </a:solidFill>
@@ -2503,7 +2503,7 @@
             </a:ln>
             <a:extLst>
               <a:ext uri="{91240B29-F687-4f45-9708-019B960494DF}">
-                <a14:hiddenLine xmlns:a14="http://schemas.microsoft.com/office/drawing/2010/main" xmlns="" w="9525">
+                <a14:hiddenLine xmlns="" xmlns:a14="http://schemas.microsoft.com/office/drawing/2010/main" w="9525">
                   <a:solidFill>
                     <a:srgbClr val="000000"/>
                   </a:solidFill>
@@ -2565,7 +2565,7 @@
             </a:ln>
             <a:extLst>
               <a:ext uri="{91240B29-F687-4f45-9708-019B960494DF}">
-                <a14:hiddenLine xmlns:a14="http://schemas.microsoft.com/office/drawing/2010/main" xmlns="" w="9525">
+                <a14:hiddenLine xmlns="" xmlns:a14="http://schemas.microsoft.com/office/drawing/2010/main" w="9525">
                   <a:solidFill>
                     <a:srgbClr val="000000"/>
                   </a:solidFill>
@@ -2655,7 +2655,7 @@
             </a:ln>
             <a:extLst>
               <a:ext uri="{91240B29-F687-4f45-9708-019B960494DF}">
-                <a14:hiddenLine xmlns:a14="http://schemas.microsoft.com/office/drawing/2010/main" xmlns="" w="9525">
+                <a14:hiddenLine xmlns="" xmlns:a14="http://schemas.microsoft.com/office/drawing/2010/main" w="9525">
                   <a:solidFill>
                     <a:srgbClr val="000000"/>
                   </a:solidFill>
@@ -2723,7 +2723,7 @@
             </a:ln>
             <a:extLst>
               <a:ext uri="{91240B29-F687-4f45-9708-019B960494DF}">
-                <a14:hiddenLine xmlns:a14="http://schemas.microsoft.com/office/drawing/2010/main" xmlns="" w="9525">
+                <a14:hiddenLine xmlns="" xmlns:a14="http://schemas.microsoft.com/office/drawing/2010/main" w="9525">
                   <a:solidFill>
                     <a:srgbClr val="000000"/>
                   </a:solidFill>
@@ -2785,7 +2785,7 @@
             </a:ln>
             <a:extLst>
               <a:ext uri="{91240B29-F687-4f45-9708-019B960494DF}">
-                <a14:hiddenLine xmlns:a14="http://schemas.microsoft.com/office/drawing/2010/main" xmlns="" w="9525">
+                <a14:hiddenLine xmlns="" xmlns:a14="http://schemas.microsoft.com/office/drawing/2010/main" w="9525">
                   <a:solidFill>
                     <a:srgbClr val="000000"/>
                   </a:solidFill>
@@ -2875,7 +2875,7 @@
             </a:ln>
             <a:extLst>
               <a:ext uri="{91240B29-F687-4f45-9708-019B960494DF}">
-                <a14:hiddenLine xmlns:a14="http://schemas.microsoft.com/office/drawing/2010/main" xmlns="" w="9525">
+                <a14:hiddenLine xmlns="" xmlns:a14="http://schemas.microsoft.com/office/drawing/2010/main" w="9525">
                   <a:solidFill>
                     <a:srgbClr val="000000"/>
                   </a:solidFill>
@@ -2937,7 +2937,7 @@
             </a:ln>
             <a:extLst>
               <a:ext uri="{91240B29-F687-4f45-9708-019B960494DF}">
-                <a14:hiddenLine xmlns:a14="http://schemas.microsoft.com/office/drawing/2010/main" xmlns="" w="9525">
+                <a14:hiddenLine xmlns="" xmlns:a14="http://schemas.microsoft.com/office/drawing/2010/main" w="9525">
                   <a:solidFill>
                     <a:srgbClr val="000000"/>
                   </a:solidFill>
@@ -3027,7 +3027,7 @@
             </a:ln>
             <a:extLst>
               <a:ext uri="{91240B29-F687-4f45-9708-019B960494DF}">
-                <a14:hiddenLine xmlns:a14="http://schemas.microsoft.com/office/drawing/2010/main" xmlns="" w="9525">
+                <a14:hiddenLine xmlns="" xmlns:a14="http://schemas.microsoft.com/office/drawing/2010/main" w="9525">
                   <a:solidFill>
                     <a:srgbClr val="000000"/>
                   </a:solidFill>
@@ -3089,7 +3089,7 @@
             </a:ln>
             <a:extLst>
               <a:ext uri="{91240B29-F687-4f45-9708-019B960494DF}">
-                <a14:hiddenLine xmlns:a14="http://schemas.microsoft.com/office/drawing/2010/main" xmlns="" w="9525">
+                <a14:hiddenLine xmlns="" xmlns:a14="http://schemas.microsoft.com/office/drawing/2010/main" w="9525">
                   <a:solidFill>
                     <a:srgbClr val="000000"/>
                   </a:solidFill>
@@ -3179,7 +3179,7 @@
             </a:ln>
             <a:extLst>
               <a:ext uri="{91240B29-F687-4f45-9708-019B960494DF}">
-                <a14:hiddenLine xmlns:a14="http://schemas.microsoft.com/office/drawing/2010/main" xmlns="" w="9525">
+                <a14:hiddenLine xmlns="" xmlns:a14="http://schemas.microsoft.com/office/drawing/2010/main" w="9525">
                   <a:solidFill>
                     <a:srgbClr val="000000"/>
                   </a:solidFill>
@@ -3213,7 +3213,7 @@
             </a:ln>
             <a:extLst>
               <a:ext uri="{91240B29-F687-4f45-9708-019B960494DF}">
-                <a14:hiddenLine xmlns:a14="http://schemas.microsoft.com/office/drawing/2010/main" xmlns="" w="9525">
+                <a14:hiddenLine xmlns="" xmlns:a14="http://schemas.microsoft.com/office/drawing/2010/main" w="9525">
                   <a:solidFill>
                     <a:srgbClr val="000000"/>
                   </a:solidFill>
@@ -3278,7 +3278,7 @@
             </a:ln>
             <a:extLst>
               <a:ext uri="{91240B29-F687-4f45-9708-019B960494DF}">
-                <a14:hiddenLine xmlns:a14="http://schemas.microsoft.com/office/drawing/2010/main" xmlns="" w="9525">
+                <a14:hiddenLine xmlns="" xmlns:a14="http://schemas.microsoft.com/office/drawing/2010/main" w="9525">
                   <a:solidFill>
                     <a:srgbClr val="000000"/>
                   </a:solidFill>
@@ -3368,7 +3368,7 @@
             </a:ln>
             <a:extLst>
               <a:ext uri="{91240B29-F687-4f45-9708-019B960494DF}">
-                <a14:hiddenLine xmlns:a14="http://schemas.microsoft.com/office/drawing/2010/main" xmlns="" w="9525">
+                <a14:hiddenLine xmlns="" xmlns:a14="http://schemas.microsoft.com/office/drawing/2010/main" w="9525">
                   <a:solidFill>
                     <a:srgbClr val="000000"/>
                   </a:solidFill>
@@ -3430,7 +3430,7 @@
             </a:ln>
             <a:extLst>
               <a:ext uri="{91240B29-F687-4f45-9708-019B960494DF}">
-                <a14:hiddenLine xmlns:a14="http://schemas.microsoft.com/office/drawing/2010/main" xmlns="" w="9525">
+                <a14:hiddenLine xmlns="" xmlns:a14="http://schemas.microsoft.com/office/drawing/2010/main" w="9525">
                   <a:solidFill>
                     <a:srgbClr val="000000"/>
                   </a:solidFill>
@@ -3520,7 +3520,7 @@
             </a:ln>
             <a:extLst>
               <a:ext uri="{91240B29-F687-4f45-9708-019B960494DF}">
-                <a14:hiddenLine xmlns:a14="http://schemas.microsoft.com/office/drawing/2010/main" xmlns="" w="9525">
+                <a14:hiddenLine xmlns="" xmlns:a14="http://schemas.microsoft.com/office/drawing/2010/main" w="9525">
                   <a:solidFill>
                     <a:srgbClr val="000000"/>
                   </a:solidFill>
@@ -3610,7 +3610,7 @@
             </a:ln>
             <a:extLst>
               <a:ext uri="{91240B29-F687-4f45-9708-019B960494DF}">
-                <a14:hiddenLine xmlns:a14="http://schemas.microsoft.com/office/drawing/2010/main" xmlns="" w="9525">
+                <a14:hiddenLine xmlns="" xmlns:a14="http://schemas.microsoft.com/office/drawing/2010/main" w="9525">
                   <a:solidFill>
                     <a:srgbClr val="000000"/>
                   </a:solidFill>
@@ -3675,7 +3675,7 @@
             </a:ln>
             <a:extLst>
               <a:ext uri="{91240B29-F687-4f45-9708-019B960494DF}">
-                <a14:hiddenLine xmlns:a14="http://schemas.microsoft.com/office/drawing/2010/main" xmlns="" w="9525">
+                <a14:hiddenLine xmlns="" xmlns:a14="http://schemas.microsoft.com/office/drawing/2010/main" w="9525">
                   <a:solidFill>
                     <a:srgbClr val="000000"/>
                   </a:solidFill>
@@ -3737,7 +3737,7 @@
             </a:ln>
             <a:extLst>
               <a:ext uri="{91240B29-F687-4f45-9708-019B960494DF}">
-                <a14:hiddenLine xmlns:a14="http://schemas.microsoft.com/office/drawing/2010/main" xmlns="" w="9525">
+                <a14:hiddenLine xmlns="" xmlns:a14="http://schemas.microsoft.com/office/drawing/2010/main" w="9525">
                   <a:solidFill>
                     <a:srgbClr val="000000"/>
                   </a:solidFill>
@@ -3827,7 +3827,7 @@
             </a:ln>
             <a:extLst>
               <a:ext uri="{91240B29-F687-4f45-9708-019B960494DF}">
-                <a14:hiddenLine xmlns:a14="http://schemas.microsoft.com/office/drawing/2010/main" xmlns="" w="9525">
+                <a14:hiddenLine xmlns="" xmlns:a14="http://schemas.microsoft.com/office/drawing/2010/main" w="9525">
                   <a:solidFill>
                     <a:srgbClr val="000000"/>
                   </a:solidFill>
@@ -3917,7 +3917,7 @@
             </a:ln>
             <a:extLst>
               <a:ext uri="{91240B29-F687-4f45-9708-019B960494DF}">
-                <a14:hiddenLine xmlns:a14="http://schemas.microsoft.com/office/drawing/2010/main" xmlns="" w="9525">
+                <a14:hiddenLine xmlns="" xmlns:a14="http://schemas.microsoft.com/office/drawing/2010/main" w="9525">
                   <a:solidFill>
                     <a:srgbClr val="000000"/>
                   </a:solidFill>
@@ -3979,7 +3979,7 @@
             </a:ln>
             <a:extLst>
               <a:ext uri="{91240B29-F687-4f45-9708-019B960494DF}">
-                <a14:hiddenLine xmlns:a14="http://schemas.microsoft.com/office/drawing/2010/main" xmlns="" w="9525">
+                <a14:hiddenLine xmlns="" xmlns:a14="http://schemas.microsoft.com/office/drawing/2010/main" w="9525">
                   <a:solidFill>
                     <a:srgbClr val="000000"/>
                   </a:solidFill>
@@ -4099,7 +4099,7 @@
             </a:ln>
             <a:extLst>
               <a:ext uri="{91240B29-F687-4f45-9708-019B960494DF}">
-                <a14:hiddenLine xmlns:a14="http://schemas.microsoft.com/office/drawing/2010/main" xmlns="" w="9525">
+                <a14:hiddenLine xmlns="" xmlns:a14="http://schemas.microsoft.com/office/drawing/2010/main" w="9525">
                   <a:solidFill>
                     <a:srgbClr val="000000"/>
                   </a:solidFill>
@@ -4167,7 +4167,7 @@
             </a:ln>
             <a:extLst>
               <a:ext uri="{91240B29-F687-4f45-9708-019B960494DF}">
-                <a14:hiddenLine xmlns:a14="http://schemas.microsoft.com/office/drawing/2010/main" xmlns="" w="9525">
+                <a14:hiddenLine xmlns="" xmlns:a14="http://schemas.microsoft.com/office/drawing/2010/main" w="9525">
                   <a:solidFill>
                     <a:srgbClr val="000000"/>
                   </a:solidFill>
@@ -4257,7 +4257,7 @@
             </a:ln>
             <a:extLst>
               <a:ext uri="{91240B29-F687-4f45-9708-019B960494DF}">
-                <a14:hiddenLine xmlns:a14="http://schemas.microsoft.com/office/drawing/2010/main" xmlns="" w="9525">
+                <a14:hiddenLine xmlns="" xmlns:a14="http://schemas.microsoft.com/office/drawing/2010/main" w="9525">
                   <a:solidFill>
                     <a:srgbClr val="000000"/>
                   </a:solidFill>
@@ -4397,7 +4397,7 @@
           <a:p>
             <a:fld id="{48A87A34-81AB-432B-8DAE-1953F412C126}" type="datetimeFigureOut">
               <a:rPr lang="en-US" dirty="0"/>
-              <a:t>5/5/2021</a:t>
+              <a:t>5/6/2021</a:t>
             </a:fld>
             <a:endParaRPr lang="en-US" dirty="0"/>
           </a:p>
@@ -4659,7 +4659,7 @@
           <a:p>
             <a:fld id="{48A87A34-81AB-432B-8DAE-1953F412C126}" type="datetimeFigureOut">
               <a:rPr lang="en-US" dirty="0"/>
-              <a:t>5/5/2021</a:t>
+              <a:t>5/6/2021</a:t>
             </a:fld>
             <a:endParaRPr lang="en-US" dirty="0"/>
           </a:p>
@@ -4850,7 +4850,7 @@
           <a:p>
             <a:fld id="{48A87A34-81AB-432B-8DAE-1953F412C126}" type="datetimeFigureOut">
               <a:rPr lang="en-US" dirty="0"/>
-              <a:t>5/5/2021</a:t>
+              <a:t>5/6/2021</a:t>
             </a:fld>
             <a:endParaRPr lang="en-US" dirty="0"/>
           </a:p>
@@ -5108,7 +5108,7 @@
           <a:p>
             <a:fld id="{48A87A34-81AB-432B-8DAE-1953F412C126}" type="datetimeFigureOut">
               <a:rPr lang="en-US" dirty="0"/>
-              <a:t>5/5/2021</a:t>
+              <a:t>5/6/2021</a:t>
             </a:fld>
             <a:endParaRPr lang="en-US" dirty="0"/>
           </a:p>
@@ -5537,7 +5537,7 @@
           <a:p>
             <a:fld id="{48A87A34-81AB-432B-8DAE-1953F412C126}" type="datetimeFigureOut">
               <a:rPr lang="en-US" dirty="0"/>
-              <a:t>5/5/2021</a:t>
+              <a:t>5/6/2021</a:t>
             </a:fld>
             <a:endParaRPr lang="en-US" dirty="0"/>
           </a:p>
@@ -6078,7 +6078,7 @@
           <a:p>
             <a:fld id="{48A87A34-81AB-432B-8DAE-1953F412C126}" type="datetimeFigureOut">
               <a:rPr lang="en-US" dirty="0"/>
-              <a:t>5/5/2021</a:t>
+              <a:t>5/6/2021</a:t>
             </a:fld>
             <a:endParaRPr lang="en-US" dirty="0"/>
           </a:p>
@@ -6793,7 +6793,7 @@
           <a:p>
             <a:fld id="{48A87A34-81AB-432B-8DAE-1953F412C126}" type="datetimeFigureOut">
               <a:rPr lang="en-US" dirty="0"/>
-              <a:t>5/5/2021</a:t>
+              <a:t>5/6/2021</a:t>
             </a:fld>
             <a:endParaRPr lang="en-US" dirty="0"/>
           </a:p>
@@ -6958,7 +6958,7 @@
           <a:p>
             <a:fld id="{48A87A34-81AB-432B-8DAE-1953F412C126}" type="datetimeFigureOut">
               <a:rPr lang="en-US" dirty="0"/>
-              <a:t>5/5/2021</a:t>
+              <a:t>5/6/2021</a:t>
             </a:fld>
             <a:endParaRPr lang="en-US" dirty="0"/>
           </a:p>
@@ -7133,7 +7133,7 @@
           <a:p>
             <a:fld id="{48A87A34-81AB-432B-8DAE-1953F412C126}" type="datetimeFigureOut">
               <a:rPr lang="en-US" dirty="0"/>
-              <a:t>5/5/2021</a:t>
+              <a:t>5/6/2021</a:t>
             </a:fld>
             <a:endParaRPr lang="en-US" dirty="0"/>
           </a:p>
@@ -7298,7 +7298,7 @@
           <a:p>
             <a:fld id="{48A87A34-81AB-432B-8DAE-1953F412C126}" type="datetimeFigureOut">
               <a:rPr lang="en-US" dirty="0"/>
-              <a:t>5/5/2021</a:t>
+              <a:t>5/6/2021</a:t>
             </a:fld>
             <a:endParaRPr lang="en-US" dirty="0"/>
           </a:p>
@@ -7543,7 +7543,7 @@
           <a:p>
             <a:fld id="{48A87A34-81AB-432B-8DAE-1953F412C126}" type="datetimeFigureOut">
               <a:rPr lang="en-US" dirty="0"/>
-              <a:t>5/5/2021</a:t>
+              <a:t>5/6/2021</a:t>
             </a:fld>
             <a:endParaRPr lang="en-US" dirty="0"/>
           </a:p>
@@ -7770,7 +7770,7 @@
           <a:p>
             <a:fld id="{48A87A34-81AB-432B-8DAE-1953F412C126}" type="datetimeFigureOut">
               <a:rPr lang="en-US" dirty="0"/>
-              <a:t>5/5/2021</a:t>
+              <a:t>5/6/2021</a:t>
             </a:fld>
             <a:endParaRPr lang="en-US" dirty="0"/>
           </a:p>
@@ -8146,7 +8146,7 @@
           <a:p>
             <a:fld id="{48A87A34-81AB-432B-8DAE-1953F412C126}" type="datetimeFigureOut">
               <a:rPr lang="en-US" dirty="0"/>
-              <a:t>5/5/2021</a:t>
+              <a:t>5/6/2021</a:t>
             </a:fld>
             <a:endParaRPr lang="en-US" dirty="0"/>
           </a:p>
@@ -8259,7 +8259,7 @@
           <a:p>
             <a:fld id="{48A87A34-81AB-432B-8DAE-1953F412C126}" type="datetimeFigureOut">
               <a:rPr lang="en-US" dirty="0"/>
-              <a:t>5/5/2021</a:t>
+              <a:t>5/6/2021</a:t>
             </a:fld>
             <a:endParaRPr lang="en-US" dirty="0"/>
           </a:p>
@@ -8349,7 +8349,7 @@
           <a:p>
             <a:fld id="{48A87A34-81AB-432B-8DAE-1953F412C126}" type="datetimeFigureOut">
               <a:rPr lang="en-US" dirty="0"/>
-              <a:t>5/5/2021</a:t>
+              <a:t>5/6/2021</a:t>
             </a:fld>
             <a:endParaRPr lang="en-US" dirty="0"/>
           </a:p>
@@ -8593,7 +8593,7 @@
           <a:p>
             <a:fld id="{48A87A34-81AB-432B-8DAE-1953F412C126}" type="datetimeFigureOut">
               <a:rPr lang="en-US" dirty="0"/>
-              <a:t>5/5/2021</a:t>
+              <a:t>5/6/2021</a:t>
             </a:fld>
             <a:endParaRPr lang="en-US" dirty="0"/>
           </a:p>
@@ -8868,7 +8868,7 @@
           <a:p>
             <a:fld id="{48A87A34-81AB-432B-8DAE-1953F412C126}" type="datetimeFigureOut">
               <a:rPr lang="en-US" dirty="0"/>
-              <a:t>5/5/2021</a:t>
+              <a:t>5/6/2021</a:t>
             </a:fld>
             <a:endParaRPr lang="en-US" dirty="0"/>
           </a:p>
@@ -8979,7 +8979,7 @@
           <a:noFill/>
           <a:extLst>
             <a:ext uri="{909E8E84-426E-40dd-AFC4-6F175D3DCCD1}">
-              <a14:hiddenFill xmlns:a14="http://schemas.microsoft.com/office/drawing/2010/main" xmlns="">
+              <a14:hiddenFill xmlns="" xmlns:a14="http://schemas.microsoft.com/office/drawing/2010/main">
                 <a:solidFill>
                   <a:srgbClr val="FFFFFF"/>
                 </a:solidFill>
@@ -9053,7 +9053,7 @@
               </a:ln>
               <a:extLst>
                 <a:ext uri="{91240B29-F687-4f45-9708-019B960494DF}">
-                  <a14:hiddenLine xmlns:a14="http://schemas.microsoft.com/office/drawing/2010/main" xmlns="" w="9525">
+                  <a14:hiddenLine xmlns="" xmlns:a14="http://schemas.microsoft.com/office/drawing/2010/main" w="9525">
                     <a:solidFill>
                       <a:srgbClr val="000000"/>
                     </a:solidFill>
@@ -9143,7 +9143,7 @@
               </a:ln>
               <a:extLst>
                 <a:ext uri="{91240B29-F687-4f45-9708-019B960494DF}">
-                  <a14:hiddenLine xmlns:a14="http://schemas.microsoft.com/office/drawing/2010/main" xmlns="" w="9525">
+                  <a14:hiddenLine xmlns="" xmlns:a14="http://schemas.microsoft.com/office/drawing/2010/main" w="9525">
                     <a:solidFill>
                       <a:srgbClr val="000000"/>
                     </a:solidFill>
@@ -9233,7 +9233,7 @@
               </a:ln>
               <a:extLst>
                 <a:ext uri="{91240B29-F687-4f45-9708-019B960494DF}">
-                  <a14:hiddenLine xmlns:a14="http://schemas.microsoft.com/office/drawing/2010/main" xmlns="" w="9525">
+                  <a14:hiddenLine xmlns="" xmlns:a14="http://schemas.microsoft.com/office/drawing/2010/main" w="9525">
                     <a:solidFill>
                       <a:srgbClr val="000000"/>
                     </a:solidFill>
@@ -9295,7 +9295,7 @@
               </a:ln>
               <a:extLst>
                 <a:ext uri="{91240B29-F687-4f45-9708-019B960494DF}">
-                  <a14:hiddenLine xmlns:a14="http://schemas.microsoft.com/office/drawing/2010/main" xmlns="" w="9525">
+                  <a14:hiddenLine xmlns="" xmlns:a14="http://schemas.microsoft.com/office/drawing/2010/main" w="9525">
                     <a:solidFill>
                       <a:srgbClr val="000000"/>
                     </a:solidFill>
@@ -9385,7 +9385,7 @@
               </a:ln>
               <a:extLst>
                 <a:ext uri="{91240B29-F687-4f45-9708-019B960494DF}">
-                  <a14:hiddenLine xmlns:a14="http://schemas.microsoft.com/office/drawing/2010/main" xmlns="" w="9525">
+                  <a14:hiddenLine xmlns="" xmlns:a14="http://schemas.microsoft.com/office/drawing/2010/main" w="9525">
                     <a:solidFill>
                       <a:srgbClr val="000000"/>
                     </a:solidFill>
@@ -9447,7 +9447,7 @@
               </a:ln>
               <a:extLst>
                 <a:ext uri="{91240B29-F687-4f45-9708-019B960494DF}">
-                  <a14:hiddenLine xmlns:a14="http://schemas.microsoft.com/office/drawing/2010/main" xmlns="" w="9525">
+                  <a14:hiddenLine xmlns="" xmlns:a14="http://schemas.microsoft.com/office/drawing/2010/main" w="9525">
                     <a:solidFill>
                       <a:srgbClr val="000000"/>
                     </a:solidFill>
@@ -9509,7 +9509,7 @@
               </a:ln>
               <a:extLst>
                 <a:ext uri="{91240B29-F687-4f45-9708-019B960494DF}">
-                  <a14:hiddenLine xmlns:a14="http://schemas.microsoft.com/office/drawing/2010/main" xmlns="" w="9525">
+                  <a14:hiddenLine xmlns="" xmlns:a14="http://schemas.microsoft.com/office/drawing/2010/main" w="9525">
                     <a:solidFill>
                       <a:srgbClr val="000000"/>
                     </a:solidFill>
@@ -9599,7 +9599,7 @@
               </a:ln>
               <a:extLst>
                 <a:ext uri="{91240B29-F687-4f45-9708-019B960494DF}">
-                  <a14:hiddenLine xmlns:a14="http://schemas.microsoft.com/office/drawing/2010/main" xmlns="" w="9525">
+                  <a14:hiddenLine xmlns="" xmlns:a14="http://schemas.microsoft.com/office/drawing/2010/main" w="9525">
                     <a:solidFill>
                       <a:srgbClr val="000000"/>
                     </a:solidFill>
@@ -9689,7 +9689,7 @@
               </a:ln>
               <a:extLst>
                 <a:ext uri="{91240B29-F687-4f45-9708-019B960494DF}">
-                  <a14:hiddenLine xmlns:a14="http://schemas.microsoft.com/office/drawing/2010/main" xmlns="" w="9525">
+                  <a14:hiddenLine xmlns="" xmlns:a14="http://schemas.microsoft.com/office/drawing/2010/main" w="9525">
                     <a:solidFill>
                       <a:srgbClr val="000000"/>
                     </a:solidFill>
@@ -9751,7 +9751,7 @@
               </a:ln>
               <a:extLst>
                 <a:ext uri="{91240B29-F687-4f45-9708-019B960494DF}">
-                  <a14:hiddenLine xmlns:a14="http://schemas.microsoft.com/office/drawing/2010/main" xmlns="" w="9525">
+                  <a14:hiddenLine xmlns="" xmlns:a14="http://schemas.microsoft.com/office/drawing/2010/main" w="9525">
                     <a:solidFill>
                       <a:srgbClr val="000000"/>
                     </a:solidFill>
@@ -9861,7 +9861,7 @@
               </a:ln>
               <a:extLst>
                 <a:ext uri="{91240B29-F687-4f45-9708-019B960494DF}">
-                  <a14:hiddenLine xmlns:a14="http://schemas.microsoft.com/office/drawing/2010/main" xmlns="" w="9525">
+                  <a14:hiddenLine xmlns="" xmlns:a14="http://schemas.microsoft.com/office/drawing/2010/main" w="9525">
                     <a:solidFill>
                       <a:srgbClr val="000000"/>
                     </a:solidFill>
@@ -9945,7 +9945,7 @@
               </a:ln>
               <a:extLst>
                 <a:ext uri="{91240B29-F687-4f45-9708-019B960494DF}">
-                  <a14:hiddenLine xmlns:a14="http://schemas.microsoft.com/office/drawing/2010/main" xmlns="" w="9525">
+                  <a14:hiddenLine xmlns="" xmlns:a14="http://schemas.microsoft.com/office/drawing/2010/main" w="9525">
                     <a:solidFill>
                       <a:srgbClr val="000000"/>
                     </a:solidFill>
@@ -10007,7 +10007,7 @@
               </a:ln>
               <a:extLst>
                 <a:ext uri="{91240B29-F687-4f45-9708-019B960494DF}">
-                  <a14:hiddenLine xmlns:a14="http://schemas.microsoft.com/office/drawing/2010/main" xmlns="" w="9525">
+                  <a14:hiddenLine xmlns="" xmlns:a14="http://schemas.microsoft.com/office/drawing/2010/main" w="9525">
                     <a:solidFill>
                       <a:srgbClr val="000000"/>
                     </a:solidFill>
@@ -10069,7 +10069,7 @@
               </a:ln>
               <a:extLst>
                 <a:ext uri="{91240B29-F687-4f45-9708-019B960494DF}">
-                  <a14:hiddenLine xmlns:a14="http://schemas.microsoft.com/office/drawing/2010/main" xmlns="" w="9525">
+                  <a14:hiddenLine xmlns="" xmlns:a14="http://schemas.microsoft.com/office/drawing/2010/main" w="9525">
                     <a:solidFill>
                       <a:srgbClr val="000000"/>
                     </a:solidFill>
@@ -10159,7 +10159,7 @@
               </a:ln>
               <a:extLst>
                 <a:ext uri="{91240B29-F687-4f45-9708-019B960494DF}">
-                  <a14:hiddenLine xmlns:a14="http://schemas.microsoft.com/office/drawing/2010/main" xmlns="" w="9525">
+                  <a14:hiddenLine xmlns="" xmlns:a14="http://schemas.microsoft.com/office/drawing/2010/main" w="9525">
                     <a:solidFill>
                       <a:srgbClr val="000000"/>
                     </a:solidFill>
@@ -10193,7 +10193,7 @@
               </a:ln>
               <a:extLst>
                 <a:ext uri="{91240B29-F687-4f45-9708-019B960494DF}">
-                  <a14:hiddenLine xmlns:a14="http://schemas.microsoft.com/office/drawing/2010/main" xmlns="" w="9525">
+                  <a14:hiddenLine xmlns="" xmlns:a14="http://schemas.microsoft.com/office/drawing/2010/main" w="9525">
                     <a:solidFill>
                       <a:srgbClr val="000000"/>
                     </a:solidFill>
@@ -10258,7 +10258,7 @@
               </a:ln>
               <a:extLst>
                 <a:ext uri="{91240B29-F687-4f45-9708-019B960494DF}">
-                  <a14:hiddenLine xmlns:a14="http://schemas.microsoft.com/office/drawing/2010/main" xmlns="" w="9525">
+                  <a14:hiddenLine xmlns="" xmlns:a14="http://schemas.microsoft.com/office/drawing/2010/main" w="9525">
                     <a:solidFill>
                       <a:srgbClr val="000000"/>
                     </a:solidFill>
@@ -10348,7 +10348,7 @@
               </a:ln>
               <a:extLst>
                 <a:ext uri="{91240B29-F687-4f45-9708-019B960494DF}">
-                  <a14:hiddenLine xmlns:a14="http://schemas.microsoft.com/office/drawing/2010/main" xmlns="" w="9525">
+                  <a14:hiddenLine xmlns="" xmlns:a14="http://schemas.microsoft.com/office/drawing/2010/main" w="9525">
                     <a:solidFill>
                       <a:srgbClr val="000000"/>
                     </a:solidFill>
@@ -10410,7 +10410,7 @@
               </a:ln>
               <a:extLst>
                 <a:ext uri="{91240B29-F687-4f45-9708-019B960494DF}">
-                  <a14:hiddenLine xmlns:a14="http://schemas.microsoft.com/office/drawing/2010/main" xmlns="" w="9525">
+                  <a14:hiddenLine xmlns="" xmlns:a14="http://schemas.microsoft.com/office/drawing/2010/main" w="9525">
                     <a:solidFill>
                       <a:srgbClr val="000000"/>
                     </a:solidFill>
@@ -10500,7 +10500,7 @@
               </a:ln>
               <a:extLst>
                 <a:ext uri="{91240B29-F687-4f45-9708-019B960494DF}">
-                  <a14:hiddenLine xmlns:a14="http://schemas.microsoft.com/office/drawing/2010/main" xmlns="" w="9525">
+                  <a14:hiddenLine xmlns="" xmlns:a14="http://schemas.microsoft.com/office/drawing/2010/main" w="9525">
                     <a:solidFill>
                       <a:srgbClr val="000000"/>
                     </a:solidFill>
@@ -10565,7 +10565,7 @@
               </a:ln>
               <a:extLst>
                 <a:ext uri="{91240B29-F687-4f45-9708-019B960494DF}">
-                  <a14:hiddenLine xmlns:a14="http://schemas.microsoft.com/office/drawing/2010/main" xmlns="" w="9525">
+                  <a14:hiddenLine xmlns="" xmlns:a14="http://schemas.microsoft.com/office/drawing/2010/main" w="9525">
                     <a:solidFill>
                       <a:srgbClr val="000000"/>
                     </a:solidFill>
@@ -10627,7 +10627,7 @@
               </a:ln>
               <a:extLst>
                 <a:ext uri="{91240B29-F687-4f45-9708-019B960494DF}">
-                  <a14:hiddenLine xmlns:a14="http://schemas.microsoft.com/office/drawing/2010/main" xmlns="" w="9525">
+                  <a14:hiddenLine xmlns="" xmlns:a14="http://schemas.microsoft.com/office/drawing/2010/main" w="9525">
                     <a:solidFill>
                       <a:srgbClr val="000000"/>
                     </a:solidFill>
@@ -10717,7 +10717,7 @@
               </a:ln>
               <a:extLst>
                 <a:ext uri="{91240B29-F687-4f45-9708-019B960494DF}">
-                  <a14:hiddenLine xmlns:a14="http://schemas.microsoft.com/office/drawing/2010/main" xmlns="" w="9525">
+                  <a14:hiddenLine xmlns="" xmlns:a14="http://schemas.microsoft.com/office/drawing/2010/main" w="9525">
                     <a:solidFill>
                       <a:srgbClr val="000000"/>
                     </a:solidFill>
@@ -10807,7 +10807,7 @@
               </a:ln>
               <a:extLst>
                 <a:ext uri="{91240B29-F687-4f45-9708-019B960494DF}">
-                  <a14:hiddenLine xmlns:a14="http://schemas.microsoft.com/office/drawing/2010/main" xmlns="" w="9525">
+                  <a14:hiddenLine xmlns="" xmlns:a14="http://schemas.microsoft.com/office/drawing/2010/main" w="9525">
                     <a:solidFill>
                       <a:srgbClr val="000000"/>
                     </a:solidFill>
@@ -10872,7 +10872,7 @@
               </a:ln>
               <a:extLst>
                 <a:ext uri="{91240B29-F687-4f45-9708-019B960494DF}">
-                  <a14:hiddenLine xmlns:a14="http://schemas.microsoft.com/office/drawing/2010/main" xmlns="" w="9525">
+                  <a14:hiddenLine xmlns="" xmlns:a14="http://schemas.microsoft.com/office/drawing/2010/main" w="9525">
                     <a:solidFill>
                       <a:srgbClr val="000000"/>
                     </a:solidFill>
@@ -10992,7 +10992,7 @@
               </a:ln>
               <a:extLst>
                 <a:ext uri="{91240B29-F687-4f45-9708-019B960494DF}">
-                  <a14:hiddenLine xmlns:a14="http://schemas.microsoft.com/office/drawing/2010/main" xmlns="" w="9525">
+                  <a14:hiddenLine xmlns="" xmlns:a14="http://schemas.microsoft.com/office/drawing/2010/main" w="9525">
                     <a:solidFill>
                       <a:srgbClr val="000000"/>
                     </a:solidFill>
@@ -11090,7 +11090,7 @@
               </a:ln>
               <a:extLst>
                 <a:ext uri="{91240B29-F687-4f45-9708-019B960494DF}">
-                  <a14:hiddenLine xmlns:a14="http://schemas.microsoft.com/office/drawing/2010/main" xmlns="" w="9525">
+                  <a14:hiddenLine xmlns="" xmlns:a14="http://schemas.microsoft.com/office/drawing/2010/main" w="9525">
                     <a:solidFill>
                       <a:srgbClr val="000000"/>
                     </a:solidFill>
@@ -11205,7 +11205,7 @@
               </a:ln>
               <a:extLst>
                 <a:ext uri="{91240B29-F687-4f45-9708-019B960494DF}">
-                  <a14:hiddenLine xmlns:a14="http://schemas.microsoft.com/office/drawing/2010/main" xmlns="" w="9525">
+                  <a14:hiddenLine xmlns="" xmlns:a14="http://schemas.microsoft.com/office/drawing/2010/main" w="9525">
                     <a:solidFill>
                       <a:srgbClr val="000000"/>
                     </a:solidFill>
@@ -11295,7 +11295,7 @@
               </a:ln>
               <a:extLst>
                 <a:ext uri="{91240B29-F687-4f45-9708-019B960494DF}">
-                  <a14:hiddenLine xmlns:a14="http://schemas.microsoft.com/office/drawing/2010/main" xmlns="" w="9525">
+                  <a14:hiddenLine xmlns="" xmlns:a14="http://schemas.microsoft.com/office/drawing/2010/main" w="9525">
                     <a:solidFill>
                       <a:srgbClr val="000000"/>
                     </a:solidFill>
@@ -11360,7 +11360,7 @@
               </a:ln>
               <a:extLst>
                 <a:ext uri="{91240B29-F687-4f45-9708-019B960494DF}">
-                  <a14:hiddenLine xmlns:a14="http://schemas.microsoft.com/office/drawing/2010/main" xmlns="" w="9525">
+                  <a14:hiddenLine xmlns="" xmlns:a14="http://schemas.microsoft.com/office/drawing/2010/main" w="9525">
                     <a:solidFill>
                       <a:srgbClr val="000000"/>
                     </a:solidFill>
@@ -11450,7 +11450,7 @@
               </a:ln>
               <a:extLst>
                 <a:ext uri="{91240B29-F687-4f45-9708-019B960494DF}">
-                  <a14:hiddenLine xmlns:a14="http://schemas.microsoft.com/office/drawing/2010/main" xmlns="" w="9525">
+                  <a14:hiddenLine xmlns="" xmlns:a14="http://schemas.microsoft.com/office/drawing/2010/main" w="9525">
                     <a:solidFill>
                       <a:srgbClr val="000000"/>
                     </a:solidFill>
@@ -11518,7 +11518,7 @@
               </a:ln>
               <a:extLst>
                 <a:ext uri="{91240B29-F687-4f45-9708-019B960494DF}">
-                  <a14:hiddenLine xmlns:a14="http://schemas.microsoft.com/office/drawing/2010/main" xmlns="" w="9525">
+                  <a14:hiddenLine xmlns="" xmlns:a14="http://schemas.microsoft.com/office/drawing/2010/main" w="9525">
                     <a:solidFill>
                       <a:srgbClr val="000000"/>
                     </a:solidFill>
@@ -11608,7 +11608,7 @@
               </a:ln>
               <a:extLst>
                 <a:ext uri="{91240B29-F687-4f45-9708-019B960494DF}">
-                  <a14:hiddenLine xmlns:a14="http://schemas.microsoft.com/office/drawing/2010/main" xmlns="" w="9525">
+                  <a14:hiddenLine xmlns="" xmlns:a14="http://schemas.microsoft.com/office/drawing/2010/main" w="9525">
                     <a:solidFill>
                       <a:srgbClr val="000000"/>
                     </a:solidFill>
@@ -11676,7 +11676,7 @@
               </a:ln>
               <a:extLst>
                 <a:ext uri="{91240B29-F687-4f45-9708-019B960494DF}">
-                  <a14:hiddenLine xmlns:a14="http://schemas.microsoft.com/office/drawing/2010/main" xmlns="" w="9525">
+                  <a14:hiddenLine xmlns="" xmlns:a14="http://schemas.microsoft.com/office/drawing/2010/main" w="9525">
                     <a:solidFill>
                       <a:srgbClr val="000000"/>
                     </a:solidFill>
@@ -11766,7 +11766,7 @@
               </a:ln>
               <a:extLst>
                 <a:ext uri="{91240B29-F687-4f45-9708-019B960494DF}">
-                  <a14:hiddenLine xmlns:a14="http://schemas.microsoft.com/office/drawing/2010/main" xmlns="" w="9525">
+                  <a14:hiddenLine xmlns="" xmlns:a14="http://schemas.microsoft.com/office/drawing/2010/main" w="9525">
                     <a:solidFill>
                       <a:srgbClr val="000000"/>
                     </a:solidFill>
@@ -11800,7 +11800,7 @@
               </a:ln>
               <a:extLst>
                 <a:ext uri="{91240B29-F687-4f45-9708-019B960494DF}">
-                  <a14:hiddenLine xmlns:a14="http://schemas.microsoft.com/office/drawing/2010/main" xmlns="" w="9525">
+                  <a14:hiddenLine xmlns="" xmlns:a14="http://schemas.microsoft.com/office/drawing/2010/main" w="9525">
                     <a:solidFill>
                       <a:srgbClr val="000000"/>
                     </a:solidFill>
@@ -11941,7 +11941,7 @@
             <a:fld id="{48A87A34-81AB-432B-8DAE-1953F412C126}" type="datetimeFigureOut">
               <a:rPr lang="en-US" dirty="0"/>
               <a:pPr/>
-              <a:t>5/5/2021</a:t>
+              <a:t>5/6/2021</a:t>
             </a:fld>
             <a:endParaRPr lang="en-US" dirty="0"/>
           </a:p>
@@ -14012,7 +14012,7 @@
             </a:ln>
             <a:extLst>
               <a:ext uri="{91240B29-F687-4f45-9708-019B960494DF}">
-                <a14:hiddenLine xmlns:a14="http://schemas.microsoft.com/office/drawing/2010/main" xmlns:p14="http://schemas.microsoft.com/office/powerpoint/2010/main" xmlns:a16="http://schemas.microsoft.com/office/drawing/2014/main" xmlns="" w="9525">
+                <a14:hiddenLine xmlns="" xmlns:a16="http://schemas.microsoft.com/office/drawing/2014/main" xmlns:p14="http://schemas.microsoft.com/office/powerpoint/2010/main" xmlns:a14="http://schemas.microsoft.com/office/drawing/2010/main" w="9525">
                   <a:solidFill>
                     <a:srgbClr val="000000"/>
                   </a:solidFill>
@@ -14117,7 +14117,7 @@
             </a:ln>
             <a:extLst>
               <a:ext uri="{91240B29-F687-4f45-9708-019B960494DF}">
-                <a14:hiddenLine xmlns:a14="http://schemas.microsoft.com/office/drawing/2010/main" xmlns:p14="http://schemas.microsoft.com/office/powerpoint/2010/main" xmlns:a16="http://schemas.microsoft.com/office/drawing/2014/main" xmlns="" w="9525">
+                <a14:hiddenLine xmlns="" xmlns:a16="http://schemas.microsoft.com/office/drawing/2014/main" xmlns:p14="http://schemas.microsoft.com/office/powerpoint/2010/main" xmlns:a14="http://schemas.microsoft.com/office/drawing/2010/main" w="9525">
                   <a:solidFill>
                     <a:srgbClr val="000000"/>
                   </a:solidFill>
@@ -14222,7 +14222,7 @@
             </a:ln>
             <a:extLst>
               <a:ext uri="{91240B29-F687-4f45-9708-019B960494DF}">
-                <a14:hiddenLine xmlns:a14="http://schemas.microsoft.com/office/drawing/2010/main" xmlns:p14="http://schemas.microsoft.com/office/powerpoint/2010/main" xmlns:a16="http://schemas.microsoft.com/office/drawing/2014/main" xmlns="" w="9525">
+                <a14:hiddenLine xmlns="" xmlns:a16="http://schemas.microsoft.com/office/drawing/2014/main" xmlns:p14="http://schemas.microsoft.com/office/powerpoint/2010/main" xmlns:a14="http://schemas.microsoft.com/office/drawing/2010/main" w="9525">
                   <a:solidFill>
                     <a:srgbClr val="000000"/>
                   </a:solidFill>
@@ -14299,7 +14299,7 @@
             </a:ln>
             <a:extLst>
               <a:ext uri="{91240B29-F687-4f45-9708-019B960494DF}">
-                <a14:hiddenLine xmlns:a14="http://schemas.microsoft.com/office/drawing/2010/main" xmlns:p14="http://schemas.microsoft.com/office/powerpoint/2010/main" xmlns:a16="http://schemas.microsoft.com/office/drawing/2014/main" xmlns="" w="9525">
+                <a14:hiddenLine xmlns="" xmlns:a16="http://schemas.microsoft.com/office/drawing/2014/main" xmlns:p14="http://schemas.microsoft.com/office/powerpoint/2010/main" xmlns:a14="http://schemas.microsoft.com/office/drawing/2010/main" w="9525">
                   <a:solidFill>
                     <a:srgbClr val="000000"/>
                   </a:solidFill>
@@ -14404,7 +14404,7 @@
             </a:ln>
             <a:extLst>
               <a:ext uri="{91240B29-F687-4f45-9708-019B960494DF}">
-                <a14:hiddenLine xmlns:a14="http://schemas.microsoft.com/office/drawing/2010/main" xmlns:p14="http://schemas.microsoft.com/office/powerpoint/2010/main" xmlns:a16="http://schemas.microsoft.com/office/drawing/2014/main" xmlns="" w="9525">
+                <a14:hiddenLine xmlns="" xmlns:a16="http://schemas.microsoft.com/office/drawing/2014/main" xmlns:p14="http://schemas.microsoft.com/office/powerpoint/2010/main" xmlns:a14="http://schemas.microsoft.com/office/drawing/2010/main" w="9525">
                   <a:solidFill>
                     <a:srgbClr val="000000"/>
                   </a:solidFill>
@@ -14481,7 +14481,7 @@
             </a:ln>
             <a:extLst>
               <a:ext uri="{91240B29-F687-4f45-9708-019B960494DF}">
-                <a14:hiddenLine xmlns:a14="http://schemas.microsoft.com/office/drawing/2010/main" xmlns:p14="http://schemas.microsoft.com/office/powerpoint/2010/main" xmlns:a16="http://schemas.microsoft.com/office/drawing/2014/main" xmlns="" w="9525">
+                <a14:hiddenLine xmlns="" xmlns:a16="http://schemas.microsoft.com/office/drawing/2014/main" xmlns:p14="http://schemas.microsoft.com/office/powerpoint/2010/main" xmlns:a14="http://schemas.microsoft.com/office/drawing/2010/main" w="9525">
                   <a:solidFill>
                     <a:srgbClr val="000000"/>
                   </a:solidFill>
@@ -14558,7 +14558,7 @@
             </a:ln>
             <a:extLst>
               <a:ext uri="{91240B29-F687-4f45-9708-019B960494DF}">
-                <a14:hiddenLine xmlns:a14="http://schemas.microsoft.com/office/drawing/2010/main" xmlns:p14="http://schemas.microsoft.com/office/powerpoint/2010/main" xmlns:a16="http://schemas.microsoft.com/office/drawing/2014/main" xmlns="" w="9525">
+                <a14:hiddenLine xmlns="" xmlns:a16="http://schemas.microsoft.com/office/drawing/2014/main" xmlns:p14="http://schemas.microsoft.com/office/powerpoint/2010/main" xmlns:a14="http://schemas.microsoft.com/office/drawing/2010/main" w="9525">
                   <a:solidFill>
                     <a:srgbClr val="000000"/>
                   </a:solidFill>
@@ -14663,7 +14663,7 @@
             </a:ln>
             <a:extLst>
               <a:ext uri="{91240B29-F687-4f45-9708-019B960494DF}">
-                <a14:hiddenLine xmlns:a14="http://schemas.microsoft.com/office/drawing/2010/main" xmlns:p14="http://schemas.microsoft.com/office/powerpoint/2010/main" xmlns:a16="http://schemas.microsoft.com/office/drawing/2014/main" xmlns="" w="9525">
+                <a14:hiddenLine xmlns="" xmlns:a16="http://schemas.microsoft.com/office/drawing/2014/main" xmlns:p14="http://schemas.microsoft.com/office/powerpoint/2010/main" xmlns:a14="http://schemas.microsoft.com/office/drawing/2010/main" w="9525">
                   <a:solidFill>
                     <a:srgbClr val="000000"/>
                   </a:solidFill>
@@ -14768,7 +14768,7 @@
             </a:ln>
             <a:extLst>
               <a:ext uri="{91240B29-F687-4f45-9708-019B960494DF}">
-                <a14:hiddenLine xmlns:a14="http://schemas.microsoft.com/office/drawing/2010/main" xmlns:p14="http://schemas.microsoft.com/office/powerpoint/2010/main" xmlns:a16="http://schemas.microsoft.com/office/drawing/2014/main" xmlns="" w="9525">
+                <a14:hiddenLine xmlns="" xmlns:a16="http://schemas.microsoft.com/office/drawing/2014/main" xmlns:p14="http://schemas.microsoft.com/office/powerpoint/2010/main" xmlns:a14="http://schemas.microsoft.com/office/drawing/2010/main" w="9525">
                   <a:solidFill>
                     <a:srgbClr val="000000"/>
                   </a:solidFill>
@@ -14845,7 +14845,7 @@
             </a:ln>
             <a:extLst>
               <a:ext uri="{91240B29-F687-4f45-9708-019B960494DF}">
-                <a14:hiddenLine xmlns:a14="http://schemas.microsoft.com/office/drawing/2010/main" xmlns:p14="http://schemas.microsoft.com/office/powerpoint/2010/main" xmlns:a16="http://schemas.microsoft.com/office/drawing/2014/main" xmlns="" w="9525">
+                <a14:hiddenLine xmlns="" xmlns:a16="http://schemas.microsoft.com/office/drawing/2014/main" xmlns:p14="http://schemas.microsoft.com/office/powerpoint/2010/main" xmlns:a14="http://schemas.microsoft.com/office/drawing/2010/main" w="9525">
                   <a:solidFill>
                     <a:srgbClr val="000000"/>
                   </a:solidFill>
@@ -14970,7 +14970,7 @@
             </a:ln>
             <a:extLst>
               <a:ext uri="{91240B29-F687-4f45-9708-019B960494DF}">
-                <a14:hiddenLine xmlns:a14="http://schemas.microsoft.com/office/drawing/2010/main" xmlns:p14="http://schemas.microsoft.com/office/powerpoint/2010/main" xmlns:a16="http://schemas.microsoft.com/office/drawing/2014/main" xmlns="" w="9525">
+                <a14:hiddenLine xmlns="" xmlns:a16="http://schemas.microsoft.com/office/drawing/2014/main" xmlns:p14="http://schemas.microsoft.com/office/powerpoint/2010/main" xmlns:a14="http://schemas.microsoft.com/office/drawing/2010/main" w="9525">
                   <a:solidFill>
                     <a:srgbClr val="000000"/>
                   </a:solidFill>
@@ -15084,7 +15084,7 @@
             </a:ln>
             <a:extLst>
               <a:ext uri="{91240B29-F687-4f45-9708-019B960494DF}">
-                <a14:hiddenLine xmlns:a14="http://schemas.microsoft.com/office/drawing/2010/main" xmlns:p14="http://schemas.microsoft.com/office/powerpoint/2010/main" xmlns:a16="http://schemas.microsoft.com/office/drawing/2014/main" xmlns="" w="9525">
+                <a14:hiddenLine xmlns="" xmlns:a16="http://schemas.microsoft.com/office/drawing/2014/main" xmlns:p14="http://schemas.microsoft.com/office/powerpoint/2010/main" xmlns:a14="http://schemas.microsoft.com/office/drawing/2010/main" w="9525">
                   <a:solidFill>
                     <a:srgbClr val="000000"/>
                   </a:solidFill>
@@ -15161,7 +15161,7 @@
             </a:ln>
             <a:extLst>
               <a:ext uri="{91240B29-F687-4f45-9708-019B960494DF}">
-                <a14:hiddenLine xmlns:a14="http://schemas.microsoft.com/office/drawing/2010/main" xmlns:p14="http://schemas.microsoft.com/office/powerpoint/2010/main" xmlns:a16="http://schemas.microsoft.com/office/drawing/2014/main" xmlns="" w="9525">
+                <a14:hiddenLine xmlns="" xmlns:a16="http://schemas.microsoft.com/office/drawing/2014/main" xmlns:p14="http://schemas.microsoft.com/office/powerpoint/2010/main" xmlns:a14="http://schemas.microsoft.com/office/drawing/2010/main" w="9525">
                   <a:solidFill>
                     <a:srgbClr val="000000"/>
                   </a:solidFill>
@@ -15238,7 +15238,7 @@
             </a:ln>
             <a:extLst>
               <a:ext uri="{91240B29-F687-4f45-9708-019B960494DF}">
-                <a14:hiddenLine xmlns:a14="http://schemas.microsoft.com/office/drawing/2010/main" xmlns:p14="http://schemas.microsoft.com/office/powerpoint/2010/main" xmlns:a16="http://schemas.microsoft.com/office/drawing/2014/main" xmlns="" w="9525">
+                <a14:hiddenLine xmlns="" xmlns:a16="http://schemas.microsoft.com/office/drawing/2014/main" xmlns:p14="http://schemas.microsoft.com/office/powerpoint/2010/main" xmlns:a14="http://schemas.microsoft.com/office/drawing/2010/main" w="9525">
                   <a:solidFill>
                     <a:srgbClr val="000000"/>
                   </a:solidFill>
@@ -15343,7 +15343,7 @@
             </a:ln>
             <a:extLst>
               <a:ext uri="{91240B29-F687-4f45-9708-019B960494DF}">
-                <a14:hiddenLine xmlns:a14="http://schemas.microsoft.com/office/drawing/2010/main" xmlns:p14="http://schemas.microsoft.com/office/powerpoint/2010/main" xmlns:a16="http://schemas.microsoft.com/office/drawing/2014/main" xmlns="" w="9525">
+                <a14:hiddenLine xmlns="" xmlns:a16="http://schemas.microsoft.com/office/drawing/2014/main" xmlns:p14="http://schemas.microsoft.com/office/powerpoint/2010/main" xmlns:a14="http://schemas.microsoft.com/office/drawing/2010/main" w="9525">
                   <a:solidFill>
                     <a:srgbClr val="000000"/>
                   </a:solidFill>
@@ -15392,7 +15392,7 @@
             </a:ln>
             <a:extLst>
               <a:ext uri="{91240B29-F687-4f45-9708-019B960494DF}">
-                <a14:hiddenLine xmlns:a14="http://schemas.microsoft.com/office/drawing/2010/main" xmlns:p14="http://schemas.microsoft.com/office/powerpoint/2010/main" xmlns:a16="http://schemas.microsoft.com/office/drawing/2014/main" xmlns="" w="9525">
+                <a14:hiddenLine xmlns="" xmlns:a16="http://schemas.microsoft.com/office/drawing/2014/main" xmlns:p14="http://schemas.microsoft.com/office/powerpoint/2010/main" xmlns:a14="http://schemas.microsoft.com/office/drawing/2010/main" w="9525">
                   <a:solidFill>
                     <a:srgbClr val="000000"/>
                   </a:solidFill>
@@ -15472,7 +15472,7 @@
             </a:ln>
             <a:extLst>
               <a:ext uri="{91240B29-F687-4f45-9708-019B960494DF}">
-                <a14:hiddenLine xmlns:a14="http://schemas.microsoft.com/office/drawing/2010/main" xmlns:p14="http://schemas.microsoft.com/office/powerpoint/2010/main" xmlns:a16="http://schemas.microsoft.com/office/drawing/2014/main" xmlns="" w="9525">
+                <a14:hiddenLine xmlns="" xmlns:a16="http://schemas.microsoft.com/office/drawing/2014/main" xmlns:p14="http://schemas.microsoft.com/office/powerpoint/2010/main" xmlns:a14="http://schemas.microsoft.com/office/drawing/2010/main" w="9525">
                   <a:solidFill>
                     <a:srgbClr val="000000"/>
                   </a:solidFill>
@@ -15577,7 +15577,7 @@
             </a:ln>
             <a:extLst>
               <a:ext uri="{91240B29-F687-4f45-9708-019B960494DF}">
-                <a14:hiddenLine xmlns:a14="http://schemas.microsoft.com/office/drawing/2010/main" xmlns:p14="http://schemas.microsoft.com/office/powerpoint/2010/main" xmlns:a16="http://schemas.microsoft.com/office/drawing/2014/main" xmlns="" w="9525">
+                <a14:hiddenLine xmlns="" xmlns:a16="http://schemas.microsoft.com/office/drawing/2014/main" xmlns:p14="http://schemas.microsoft.com/office/powerpoint/2010/main" xmlns:a14="http://schemas.microsoft.com/office/drawing/2010/main" w="9525">
                   <a:solidFill>
                     <a:srgbClr val="000000"/>
                   </a:solidFill>
@@ -15654,7 +15654,7 @@
             </a:ln>
             <a:extLst>
               <a:ext uri="{91240B29-F687-4f45-9708-019B960494DF}">
-                <a14:hiddenLine xmlns:a14="http://schemas.microsoft.com/office/drawing/2010/main" xmlns:p14="http://schemas.microsoft.com/office/powerpoint/2010/main" xmlns:a16="http://schemas.microsoft.com/office/drawing/2014/main" xmlns="" w="9525">
+                <a14:hiddenLine xmlns="" xmlns:a16="http://schemas.microsoft.com/office/drawing/2014/main" xmlns:p14="http://schemas.microsoft.com/office/powerpoint/2010/main" xmlns:a14="http://schemas.microsoft.com/office/drawing/2010/main" w="9525">
                   <a:solidFill>
                     <a:srgbClr val="000000"/>
                   </a:solidFill>
@@ -15759,7 +15759,7 @@
             </a:ln>
             <a:extLst>
               <a:ext uri="{91240B29-F687-4f45-9708-019B960494DF}">
-                <a14:hiddenLine xmlns:a14="http://schemas.microsoft.com/office/drawing/2010/main" xmlns:p14="http://schemas.microsoft.com/office/powerpoint/2010/main" xmlns:a16="http://schemas.microsoft.com/office/drawing/2014/main" xmlns="" w="9525">
+                <a14:hiddenLine xmlns="" xmlns:a16="http://schemas.microsoft.com/office/drawing/2014/main" xmlns:p14="http://schemas.microsoft.com/office/powerpoint/2010/main" xmlns:a14="http://schemas.microsoft.com/office/drawing/2010/main" w="9525">
                   <a:solidFill>
                     <a:srgbClr val="000000"/>
                   </a:solidFill>
@@ -15839,7 +15839,7 @@
             </a:ln>
             <a:extLst>
               <a:ext uri="{91240B29-F687-4f45-9708-019B960494DF}">
-                <a14:hiddenLine xmlns:a14="http://schemas.microsoft.com/office/drawing/2010/main" xmlns:p14="http://schemas.microsoft.com/office/powerpoint/2010/main" xmlns:a16="http://schemas.microsoft.com/office/drawing/2014/main" xmlns="" w="9525">
+                <a14:hiddenLine xmlns="" xmlns:a16="http://schemas.microsoft.com/office/drawing/2014/main" xmlns:p14="http://schemas.microsoft.com/office/powerpoint/2010/main" xmlns:a14="http://schemas.microsoft.com/office/drawing/2010/main" w="9525">
                   <a:solidFill>
                     <a:srgbClr val="000000"/>
                   </a:solidFill>
@@ -15916,7 +15916,7 @@
             </a:ln>
             <a:extLst>
               <a:ext uri="{91240B29-F687-4f45-9708-019B960494DF}">
-                <a14:hiddenLine xmlns:a14="http://schemas.microsoft.com/office/drawing/2010/main" xmlns:p14="http://schemas.microsoft.com/office/powerpoint/2010/main" xmlns:a16="http://schemas.microsoft.com/office/drawing/2014/main" xmlns="" w="9525">
+                <a14:hiddenLine xmlns="" xmlns:a16="http://schemas.microsoft.com/office/drawing/2014/main" xmlns:p14="http://schemas.microsoft.com/office/powerpoint/2010/main" xmlns:a14="http://schemas.microsoft.com/office/drawing/2010/main" w="9525">
                   <a:solidFill>
                     <a:srgbClr val="000000"/>
                   </a:solidFill>
@@ -16021,7 +16021,7 @@
             </a:ln>
             <a:extLst>
               <a:ext uri="{91240B29-F687-4f45-9708-019B960494DF}">
-                <a14:hiddenLine xmlns:a14="http://schemas.microsoft.com/office/drawing/2010/main" xmlns:p14="http://schemas.microsoft.com/office/powerpoint/2010/main" xmlns:a16="http://schemas.microsoft.com/office/drawing/2014/main" xmlns="" w="9525">
+                <a14:hiddenLine xmlns="" xmlns:a16="http://schemas.microsoft.com/office/drawing/2014/main" xmlns:p14="http://schemas.microsoft.com/office/powerpoint/2010/main" xmlns:a14="http://schemas.microsoft.com/office/drawing/2010/main" w="9525">
                   <a:solidFill>
                     <a:srgbClr val="000000"/>
                   </a:solidFill>
@@ -16126,7 +16126,7 @@
             </a:ln>
             <a:extLst>
               <a:ext uri="{91240B29-F687-4f45-9708-019B960494DF}">
-                <a14:hiddenLine xmlns:a14="http://schemas.microsoft.com/office/drawing/2010/main" xmlns:p14="http://schemas.microsoft.com/office/powerpoint/2010/main" xmlns:a16="http://schemas.microsoft.com/office/drawing/2014/main" xmlns="" w="9525">
+                <a14:hiddenLine xmlns="" xmlns:a16="http://schemas.microsoft.com/office/drawing/2014/main" xmlns:p14="http://schemas.microsoft.com/office/powerpoint/2010/main" xmlns:a14="http://schemas.microsoft.com/office/drawing/2010/main" w="9525">
                   <a:solidFill>
                     <a:srgbClr val="000000"/>
                   </a:solidFill>
@@ -16206,7 +16206,7 @@
             </a:ln>
             <a:extLst>
               <a:ext uri="{91240B29-F687-4f45-9708-019B960494DF}">
-                <a14:hiddenLine xmlns:a14="http://schemas.microsoft.com/office/drawing/2010/main" xmlns:p14="http://schemas.microsoft.com/office/powerpoint/2010/main" xmlns:a16="http://schemas.microsoft.com/office/drawing/2014/main" xmlns="" w="9525">
+                <a14:hiddenLine xmlns="" xmlns:a16="http://schemas.microsoft.com/office/drawing/2014/main" xmlns:p14="http://schemas.microsoft.com/office/powerpoint/2010/main" xmlns:a14="http://schemas.microsoft.com/office/drawing/2010/main" w="9525">
                   <a:solidFill>
                     <a:srgbClr val="000000"/>
                   </a:solidFill>
@@ -16341,7 +16341,7 @@
             </a:ln>
             <a:extLst>
               <a:ext uri="{91240B29-F687-4f45-9708-019B960494DF}">
-                <a14:hiddenLine xmlns:a14="http://schemas.microsoft.com/office/drawing/2010/main" xmlns:p14="http://schemas.microsoft.com/office/powerpoint/2010/main" xmlns:a16="http://schemas.microsoft.com/office/drawing/2014/main" xmlns="" w="9525">
+                <a14:hiddenLine xmlns="" xmlns:a16="http://schemas.microsoft.com/office/drawing/2014/main" xmlns:p14="http://schemas.microsoft.com/office/powerpoint/2010/main" xmlns:a14="http://schemas.microsoft.com/office/drawing/2010/main" w="9525">
                   <a:solidFill>
                     <a:srgbClr val="000000"/>
                   </a:solidFill>
@@ -16620,7 +16620,7 @@
             </a:ln>
             <a:extLst>
               <a:ext uri="{91240B29-F687-4f45-9708-019B960494DF}">
-                <a14:hiddenLine xmlns:a14="http://schemas.microsoft.com/office/drawing/2010/main" xmlns:p14="http://schemas.microsoft.com/office/powerpoint/2010/main" xmlns:a16="http://schemas.microsoft.com/office/drawing/2014/main" xmlns="" w="9525">
+                <a14:hiddenLine xmlns="" xmlns:a16="http://schemas.microsoft.com/office/drawing/2014/main" xmlns:p14="http://schemas.microsoft.com/office/powerpoint/2010/main" xmlns:a14="http://schemas.microsoft.com/office/drawing/2010/main" w="9525">
                   <a:solidFill>
                     <a:srgbClr val="000000"/>
                   </a:solidFill>
@@ -16750,7 +16750,7 @@
             </a:ln>
             <a:extLst>
               <a:ext uri="{91240B29-F687-4f45-9708-019B960494DF}">
-                <a14:hiddenLine xmlns:a14="http://schemas.microsoft.com/office/drawing/2010/main" xmlns:p14="http://schemas.microsoft.com/office/powerpoint/2010/main" xmlns:a16="http://schemas.microsoft.com/office/drawing/2014/main" xmlns="" w="9525">
+                <a14:hiddenLine xmlns="" xmlns:a16="http://schemas.microsoft.com/office/drawing/2014/main" xmlns:p14="http://schemas.microsoft.com/office/powerpoint/2010/main" xmlns:a14="http://schemas.microsoft.com/office/drawing/2010/main" w="9525">
                   <a:solidFill>
                     <a:srgbClr val="000000"/>
                   </a:solidFill>
@@ -16855,7 +16855,7 @@
             </a:ln>
             <a:extLst>
               <a:ext uri="{91240B29-F687-4f45-9708-019B960494DF}">
-                <a14:hiddenLine xmlns:a14="http://schemas.microsoft.com/office/drawing/2010/main" xmlns:p14="http://schemas.microsoft.com/office/powerpoint/2010/main" xmlns:a16="http://schemas.microsoft.com/office/drawing/2014/main" xmlns="" w="9525">
+                <a14:hiddenLine xmlns="" xmlns:a16="http://schemas.microsoft.com/office/drawing/2014/main" xmlns:p14="http://schemas.microsoft.com/office/powerpoint/2010/main" xmlns:a14="http://schemas.microsoft.com/office/drawing/2010/main" w="9525">
                   <a:solidFill>
                     <a:srgbClr val="000000"/>
                   </a:solidFill>
@@ -16935,7 +16935,7 @@
             </a:ln>
             <a:extLst>
               <a:ext uri="{91240B29-F687-4f45-9708-019B960494DF}">
-                <a14:hiddenLine xmlns:a14="http://schemas.microsoft.com/office/drawing/2010/main" xmlns:p14="http://schemas.microsoft.com/office/powerpoint/2010/main" xmlns:a16="http://schemas.microsoft.com/office/drawing/2014/main" xmlns="" w="9525">
+                <a14:hiddenLine xmlns="" xmlns:a16="http://schemas.microsoft.com/office/drawing/2014/main" xmlns:p14="http://schemas.microsoft.com/office/powerpoint/2010/main" xmlns:a14="http://schemas.microsoft.com/office/drawing/2010/main" w="9525">
                   <a:solidFill>
                     <a:srgbClr val="000000"/>
                   </a:solidFill>
@@ -17040,7 +17040,7 @@
             </a:ln>
             <a:extLst>
               <a:ext uri="{91240B29-F687-4f45-9708-019B960494DF}">
-                <a14:hiddenLine xmlns:a14="http://schemas.microsoft.com/office/drawing/2010/main" xmlns:p14="http://schemas.microsoft.com/office/powerpoint/2010/main" xmlns:a16="http://schemas.microsoft.com/office/drawing/2014/main" xmlns="" w="9525">
+                <a14:hiddenLine xmlns="" xmlns:a16="http://schemas.microsoft.com/office/drawing/2014/main" xmlns:p14="http://schemas.microsoft.com/office/powerpoint/2010/main" xmlns:a14="http://schemas.microsoft.com/office/drawing/2010/main" w="9525">
                   <a:solidFill>
                     <a:srgbClr val="000000"/>
                   </a:solidFill>
@@ -17123,7 +17123,7 @@
             </a:ln>
             <a:extLst>
               <a:ext uri="{91240B29-F687-4f45-9708-019B960494DF}">
-                <a14:hiddenLine xmlns:a14="http://schemas.microsoft.com/office/drawing/2010/main" xmlns:p14="http://schemas.microsoft.com/office/powerpoint/2010/main" xmlns:a16="http://schemas.microsoft.com/office/drawing/2014/main" xmlns="" w="9525">
+                <a14:hiddenLine xmlns="" xmlns:a16="http://schemas.microsoft.com/office/drawing/2014/main" xmlns:p14="http://schemas.microsoft.com/office/powerpoint/2010/main" xmlns:a14="http://schemas.microsoft.com/office/drawing/2010/main" w="9525">
                   <a:solidFill>
                     <a:srgbClr val="000000"/>
                   </a:solidFill>
@@ -17228,7 +17228,7 @@
             </a:ln>
             <a:extLst>
               <a:ext uri="{91240B29-F687-4f45-9708-019B960494DF}">
-                <a14:hiddenLine xmlns:a14="http://schemas.microsoft.com/office/drawing/2010/main" xmlns:p14="http://schemas.microsoft.com/office/powerpoint/2010/main" xmlns:a16="http://schemas.microsoft.com/office/drawing/2014/main" xmlns="" w="9525">
+                <a14:hiddenLine xmlns="" xmlns:a16="http://schemas.microsoft.com/office/drawing/2014/main" xmlns:p14="http://schemas.microsoft.com/office/powerpoint/2010/main" xmlns:a14="http://schemas.microsoft.com/office/drawing/2010/main" w="9525">
                   <a:solidFill>
                     <a:srgbClr val="000000"/>
                   </a:solidFill>
@@ -17311,7 +17311,7 @@
             </a:ln>
             <a:extLst>
               <a:ext uri="{91240B29-F687-4f45-9708-019B960494DF}">
-                <a14:hiddenLine xmlns:a14="http://schemas.microsoft.com/office/drawing/2010/main" xmlns:p14="http://schemas.microsoft.com/office/powerpoint/2010/main" xmlns:a16="http://schemas.microsoft.com/office/drawing/2014/main" xmlns="" w="9525">
+                <a14:hiddenLine xmlns="" xmlns:a16="http://schemas.microsoft.com/office/drawing/2014/main" xmlns:p14="http://schemas.microsoft.com/office/powerpoint/2010/main" xmlns:a14="http://schemas.microsoft.com/office/drawing/2010/main" w="9525">
                   <a:solidFill>
                     <a:srgbClr val="000000"/>
                   </a:solidFill>
@@ -17416,7 +17416,7 @@
             </a:ln>
             <a:extLst>
               <a:ext uri="{91240B29-F687-4f45-9708-019B960494DF}">
-                <a14:hiddenLine xmlns:a14="http://schemas.microsoft.com/office/drawing/2010/main" xmlns:p14="http://schemas.microsoft.com/office/powerpoint/2010/main" xmlns:a16="http://schemas.microsoft.com/office/drawing/2014/main" xmlns="" w="9525">
+                <a14:hiddenLine xmlns="" xmlns:a16="http://schemas.microsoft.com/office/drawing/2014/main" xmlns:p14="http://schemas.microsoft.com/office/powerpoint/2010/main" xmlns:a14="http://schemas.microsoft.com/office/drawing/2010/main" w="9525">
                   <a:solidFill>
                     <a:srgbClr val="000000"/>
                   </a:solidFill>
@@ -17465,7 +17465,7 @@
             </a:ln>
             <a:extLst>
               <a:ext uri="{91240B29-F687-4f45-9708-019B960494DF}">
-                <a14:hiddenLine xmlns:a14="http://schemas.microsoft.com/office/drawing/2010/main" xmlns:p14="http://schemas.microsoft.com/office/powerpoint/2010/main" xmlns:a16="http://schemas.microsoft.com/office/drawing/2014/main" xmlns="" w="9525">
+                <a14:hiddenLine xmlns="" xmlns:a16="http://schemas.microsoft.com/office/drawing/2014/main" xmlns:p14="http://schemas.microsoft.com/office/powerpoint/2010/main" xmlns:a14="http://schemas.microsoft.com/office/drawing/2010/main" w="9525">
                   <a:solidFill>
                     <a:srgbClr val="000000"/>
                   </a:solidFill>
@@ -17590,7 +17590,7 @@
         </p:blipFill>
         <p:spPr>
           <a:xfrm>
-            <a:off x="1407276" y="6239482"/>
+            <a:off x="1401359" y="6313442"/>
             <a:ext cx="9640135" cy="259102"/>
           </a:xfrm>
         </p:spPr>
@@ -17617,7 +17617,7 @@
         </p:blipFill>
         <p:spPr>
           <a:xfrm>
-            <a:off x="1407276" y="5763847"/>
+            <a:off x="1347691" y="5980373"/>
             <a:ext cx="9493441" cy="259101"/>
           </a:xfrm>
           <a:prstGeom prst="rect">
@@ -17647,7 +17647,7 @@
         </p:blipFill>
         <p:spPr>
           <a:xfrm>
-            <a:off x="4997700" y="4360429"/>
+            <a:off x="4855657" y="4719521"/>
             <a:ext cx="6845112" cy="1186884"/>
           </a:xfrm>
           <a:prstGeom prst="rect">
@@ -17670,7 +17670,7 @@
         <p:spPr>
           <a:xfrm>
             <a:off x="1141413" y="2313622"/>
-            <a:ext cx="5419185" cy="2246769"/>
+            <a:ext cx="5419185" cy="2554545"/>
           </a:xfrm>
           <a:prstGeom prst="rect">
             <a:avLst/>
@@ -17714,6 +17714,16 @@
             <a:r>
               <a:rPr lang="sk-SK" sz="2000" dirty="0"/>
               <a:t>)</a:t>
+            </a:r>
+          </a:p>
+          <a:p>
+            <a:pPr marL="342900" indent="-342900">
+              <a:buFont typeface="Arial" panose="020B0604020202020204" pitchFamily="34" charset="0"/>
+              <a:buChar char="•"/>
+            </a:pPr>
+            <a:r>
+              <a:rPr lang="sk-SK" sz="2000" dirty="0"/>
+              <a:t>f(x)=max(0,x)</a:t>
             </a:r>
           </a:p>
           <a:p>
@@ -18499,7 +18509,7 @@
           <a:noFill/>
           <a:extLst>
             <a:ext uri="{909E8E84-426E-40dd-AFC4-6F175D3DCCD1}">
-              <a14:hiddenFill xmlns="" xmlns:a16="http://schemas.microsoft.com/office/drawing/2014/main" xmlns:a14="http://schemas.microsoft.com/office/drawing/2010/main">
+              <a14:hiddenFill xmlns:a14="http://schemas.microsoft.com/office/drawing/2010/main" xmlns:a16="http://schemas.microsoft.com/office/drawing/2014/main" xmlns="">
                 <a:solidFill>
                   <a:srgbClr val="FFFFFF"/>
                 </a:solidFill>
@@ -18591,7 +18601,7 @@
             </a:ln>
             <a:extLst>
               <a:ext uri="{91240B29-F687-4f45-9708-019B960494DF}">
-                <a14:hiddenLine xmlns="" xmlns:a16="http://schemas.microsoft.com/office/drawing/2014/main" xmlns:a14="http://schemas.microsoft.com/office/drawing/2010/main" w="9525">
+                <a14:hiddenLine xmlns:a14="http://schemas.microsoft.com/office/drawing/2010/main" xmlns:a16="http://schemas.microsoft.com/office/drawing/2014/main" xmlns="" w="9525">
                   <a:solidFill>
                     <a:srgbClr val="000000"/>
                   </a:solidFill>
@@ -18696,7 +18706,7 @@
             </a:ln>
             <a:extLst>
               <a:ext uri="{91240B29-F687-4f45-9708-019B960494DF}">
-                <a14:hiddenLine xmlns="" xmlns:a16="http://schemas.microsoft.com/office/drawing/2014/main" xmlns:a14="http://schemas.microsoft.com/office/drawing/2010/main" w="9525">
+                <a14:hiddenLine xmlns:a14="http://schemas.microsoft.com/office/drawing/2010/main" xmlns:a16="http://schemas.microsoft.com/office/drawing/2014/main" xmlns="" w="9525">
                   <a:solidFill>
                     <a:srgbClr val="000000"/>
                   </a:solidFill>
@@ -18801,7 +18811,7 @@
             </a:ln>
             <a:extLst>
               <a:ext uri="{91240B29-F687-4f45-9708-019B960494DF}">
-                <a14:hiddenLine xmlns="" xmlns:a16="http://schemas.microsoft.com/office/drawing/2014/main" xmlns:a14="http://schemas.microsoft.com/office/drawing/2010/main" w="9525">
+                <a14:hiddenLine xmlns:a14="http://schemas.microsoft.com/office/drawing/2010/main" xmlns:a16="http://schemas.microsoft.com/office/drawing/2014/main" xmlns="" w="9525">
                   <a:solidFill>
                     <a:srgbClr val="000000"/>
                   </a:solidFill>
@@ -18850,7 +18860,7 @@
             </a:ln>
             <a:extLst>
               <a:ext uri="{91240B29-F687-4f45-9708-019B960494DF}">
-                <a14:hiddenLine xmlns="" xmlns:a16="http://schemas.microsoft.com/office/drawing/2014/main" xmlns:a14="http://schemas.microsoft.com/office/drawing/2010/main" w="9525">
+                <a14:hiddenLine xmlns:a14="http://schemas.microsoft.com/office/drawing/2010/main" xmlns:a16="http://schemas.microsoft.com/office/drawing/2014/main" xmlns="" w="9525">
                   <a:solidFill>
                     <a:srgbClr val="000000"/>
                   </a:solidFill>
@@ -18955,7 +18965,7 @@
             </a:ln>
             <a:extLst>
               <a:ext uri="{91240B29-F687-4f45-9708-019B960494DF}">
-                <a14:hiddenLine xmlns="" xmlns:a16="http://schemas.microsoft.com/office/drawing/2014/main" xmlns:a14="http://schemas.microsoft.com/office/drawing/2010/main" w="9525">
+                <a14:hiddenLine xmlns:a14="http://schemas.microsoft.com/office/drawing/2010/main" xmlns:a16="http://schemas.microsoft.com/office/drawing/2014/main" xmlns="" w="9525">
                   <a:solidFill>
                     <a:srgbClr val="000000"/>
                   </a:solidFill>
@@ -19032,7 +19042,7 @@
             </a:ln>
             <a:extLst>
               <a:ext uri="{91240B29-F687-4f45-9708-019B960494DF}">
-                <a14:hiddenLine xmlns="" xmlns:a16="http://schemas.microsoft.com/office/drawing/2014/main" xmlns:a14="http://schemas.microsoft.com/office/drawing/2010/main" w="9525">
+                <a14:hiddenLine xmlns:a14="http://schemas.microsoft.com/office/drawing/2010/main" xmlns:a16="http://schemas.microsoft.com/office/drawing/2014/main" xmlns="" w="9525">
                   <a:solidFill>
                     <a:srgbClr val="000000"/>
                   </a:solidFill>
@@ -19109,7 +19119,7 @@
             </a:ln>
             <a:extLst>
               <a:ext uri="{91240B29-F687-4f45-9708-019B960494DF}">
-                <a14:hiddenLine xmlns="" xmlns:a16="http://schemas.microsoft.com/office/drawing/2014/main" xmlns:a14="http://schemas.microsoft.com/office/drawing/2010/main" w="9525">
+                <a14:hiddenLine xmlns:a14="http://schemas.microsoft.com/office/drawing/2010/main" xmlns:a16="http://schemas.microsoft.com/office/drawing/2014/main" xmlns="" w="9525">
                   <a:solidFill>
                     <a:srgbClr val="000000"/>
                   </a:solidFill>
@@ -19214,7 +19224,7 @@
             </a:ln>
             <a:extLst>
               <a:ext uri="{91240B29-F687-4f45-9708-019B960494DF}">
-                <a14:hiddenLine xmlns="" xmlns:a16="http://schemas.microsoft.com/office/drawing/2014/main" xmlns:a14="http://schemas.microsoft.com/office/drawing/2010/main" w="9525">
+                <a14:hiddenLine xmlns:a14="http://schemas.microsoft.com/office/drawing/2010/main" xmlns:a16="http://schemas.microsoft.com/office/drawing/2014/main" xmlns="" w="9525">
                   <a:solidFill>
                     <a:srgbClr val="000000"/>
                   </a:solidFill>
@@ -19291,7 +19301,7 @@
             </a:ln>
             <a:extLst>
               <a:ext uri="{91240B29-F687-4f45-9708-019B960494DF}">
-                <a14:hiddenLine xmlns="" xmlns:a16="http://schemas.microsoft.com/office/drawing/2014/main" xmlns:a14="http://schemas.microsoft.com/office/drawing/2010/main" w="9525">
+                <a14:hiddenLine xmlns:a14="http://schemas.microsoft.com/office/drawing/2010/main" xmlns:a16="http://schemas.microsoft.com/office/drawing/2014/main" xmlns="" w="9525">
                   <a:solidFill>
                     <a:srgbClr val="000000"/>
                   </a:solidFill>
@@ -19368,7 +19378,7 @@
             </a:ln>
             <a:extLst>
               <a:ext uri="{91240B29-F687-4f45-9708-019B960494DF}">
-                <a14:hiddenLine xmlns="" xmlns:a16="http://schemas.microsoft.com/office/drawing/2014/main" xmlns:a14="http://schemas.microsoft.com/office/drawing/2010/main" w="9525">
+                <a14:hiddenLine xmlns:a14="http://schemas.microsoft.com/office/drawing/2010/main" xmlns:a16="http://schemas.microsoft.com/office/drawing/2014/main" xmlns="" w="9525">
                   <a:solidFill>
                     <a:srgbClr val="000000"/>
                   </a:solidFill>
@@ -19473,7 +19483,7 @@
             </a:ln>
             <a:extLst>
               <a:ext uri="{91240B29-F687-4f45-9708-019B960494DF}">
-                <a14:hiddenLine xmlns="" xmlns:a16="http://schemas.microsoft.com/office/drawing/2014/main" xmlns:a14="http://schemas.microsoft.com/office/drawing/2010/main" w="9525">
+                <a14:hiddenLine xmlns:a14="http://schemas.microsoft.com/office/drawing/2010/main" xmlns:a16="http://schemas.microsoft.com/office/drawing/2014/main" xmlns="" w="9525">
                   <a:solidFill>
                     <a:srgbClr val="000000"/>
                   </a:solidFill>
@@ -19578,7 +19588,7 @@
             </a:ln>
             <a:extLst>
               <a:ext uri="{91240B29-F687-4f45-9708-019B960494DF}">
-                <a14:hiddenLine xmlns="" xmlns:a16="http://schemas.microsoft.com/office/drawing/2014/main" xmlns:a14="http://schemas.microsoft.com/office/drawing/2010/main" w="9525">
+                <a14:hiddenLine xmlns:a14="http://schemas.microsoft.com/office/drawing/2010/main" xmlns:a16="http://schemas.microsoft.com/office/drawing/2014/main" xmlns="" w="9525">
                   <a:solidFill>
                     <a:srgbClr val="000000"/>
                   </a:solidFill>
@@ -19655,7 +19665,7 @@
             </a:ln>
             <a:extLst>
               <a:ext uri="{91240B29-F687-4f45-9708-019B960494DF}">
-                <a14:hiddenLine xmlns="" xmlns:a16="http://schemas.microsoft.com/office/drawing/2014/main" xmlns:a14="http://schemas.microsoft.com/office/drawing/2010/main" w="9525">
+                <a14:hiddenLine xmlns:a14="http://schemas.microsoft.com/office/drawing/2010/main" xmlns:a16="http://schemas.microsoft.com/office/drawing/2014/main" xmlns="" w="9525">
                   <a:solidFill>
                     <a:srgbClr val="000000"/>
                   </a:solidFill>
@@ -19780,7 +19790,7 @@
             </a:ln>
             <a:extLst>
               <a:ext uri="{91240B29-F687-4f45-9708-019B960494DF}">
-                <a14:hiddenLine xmlns="" xmlns:a16="http://schemas.microsoft.com/office/drawing/2014/main" xmlns:a14="http://schemas.microsoft.com/office/drawing/2010/main" w="9525">
+                <a14:hiddenLine xmlns:a14="http://schemas.microsoft.com/office/drawing/2010/main" xmlns:a16="http://schemas.microsoft.com/office/drawing/2014/main" xmlns="" w="9525">
                   <a:solidFill>
                     <a:srgbClr val="000000"/>
                   </a:solidFill>
@@ -19857,7 +19867,7 @@
             </a:ln>
             <a:extLst>
               <a:ext uri="{91240B29-F687-4f45-9708-019B960494DF}">
-                <a14:hiddenLine xmlns="" xmlns:a16="http://schemas.microsoft.com/office/drawing/2014/main" xmlns:a14="http://schemas.microsoft.com/office/drawing/2010/main" w="9525">
+                <a14:hiddenLine xmlns:a14="http://schemas.microsoft.com/office/drawing/2010/main" xmlns:a16="http://schemas.microsoft.com/office/drawing/2014/main" xmlns="" w="9525">
                   <a:solidFill>
                     <a:srgbClr val="000000"/>
                   </a:solidFill>
@@ -19962,7 +19972,7 @@
             </a:ln>
             <a:extLst>
               <a:ext uri="{91240B29-F687-4f45-9708-019B960494DF}">
-                <a14:hiddenLine xmlns="" xmlns:a16="http://schemas.microsoft.com/office/drawing/2014/main" xmlns:a14="http://schemas.microsoft.com/office/drawing/2010/main" w="9525">
+                <a14:hiddenLine xmlns:a14="http://schemas.microsoft.com/office/drawing/2010/main" xmlns:a16="http://schemas.microsoft.com/office/drawing/2014/main" xmlns="" w="9525">
                   <a:solidFill>
                     <a:srgbClr val="000000"/>
                   </a:solidFill>
@@ -20067,7 +20077,7 @@
             </a:ln>
             <a:extLst>
               <a:ext uri="{91240B29-F687-4f45-9708-019B960494DF}">
-                <a14:hiddenLine xmlns="" xmlns:a16="http://schemas.microsoft.com/office/drawing/2014/main" xmlns:a14="http://schemas.microsoft.com/office/drawing/2010/main" w="9525">
+                <a14:hiddenLine xmlns:a14="http://schemas.microsoft.com/office/drawing/2010/main" xmlns:a16="http://schemas.microsoft.com/office/drawing/2014/main" xmlns="" w="9525">
                   <a:solidFill>
                     <a:srgbClr val="000000"/>
                   </a:solidFill>
@@ -20144,7 +20154,7 @@
             </a:ln>
             <a:extLst>
               <a:ext uri="{91240B29-F687-4f45-9708-019B960494DF}">
-                <a14:hiddenLine xmlns="" xmlns:a16="http://schemas.microsoft.com/office/drawing/2014/main" xmlns:a14="http://schemas.microsoft.com/office/drawing/2010/main" w="9525">
+                <a14:hiddenLine xmlns:a14="http://schemas.microsoft.com/office/drawing/2010/main" xmlns:a16="http://schemas.microsoft.com/office/drawing/2014/main" xmlns="" w="9525">
                   <a:solidFill>
                     <a:srgbClr val="000000"/>
                   </a:solidFill>
@@ -20249,7 +20259,7 @@
             </a:ln>
             <a:extLst>
               <a:ext uri="{91240B29-F687-4f45-9708-019B960494DF}">
-                <a14:hiddenLine xmlns="" xmlns:a16="http://schemas.microsoft.com/office/drawing/2014/main" xmlns:a14="http://schemas.microsoft.com/office/drawing/2010/main" w="9525">
+                <a14:hiddenLine xmlns:a14="http://schemas.microsoft.com/office/drawing/2010/main" xmlns:a16="http://schemas.microsoft.com/office/drawing/2014/main" xmlns="" w="9525">
                   <a:solidFill>
                     <a:srgbClr val="000000"/>
                   </a:solidFill>
@@ -20354,7 +20364,7 @@
             </a:ln>
             <a:extLst>
               <a:ext uri="{91240B29-F687-4f45-9708-019B960494DF}">
-                <a14:hiddenLine xmlns="" xmlns:a16="http://schemas.microsoft.com/office/drawing/2014/main" xmlns:a14="http://schemas.microsoft.com/office/drawing/2010/main" w="9525">
+                <a14:hiddenLine xmlns:a14="http://schemas.microsoft.com/office/drawing/2010/main" xmlns:a16="http://schemas.microsoft.com/office/drawing/2014/main" xmlns="" w="9525">
                   <a:solidFill>
                     <a:srgbClr val="000000"/>
                   </a:solidFill>
@@ -20425,7 +20435,7 @@
             </a:ln>
             <a:extLst>
               <a:ext uri="{91240B29-F687-4f45-9708-019B960494DF}">
-                <a14:hiddenLine xmlns="" xmlns:a16="http://schemas.microsoft.com/office/drawing/2014/main" xmlns:a14="http://schemas.microsoft.com/office/drawing/2010/main" w="9525">
+                <a14:hiddenLine xmlns:a14="http://schemas.microsoft.com/office/drawing/2010/main" xmlns:a16="http://schemas.microsoft.com/office/drawing/2014/main" xmlns="" w="9525">
                   <a:solidFill>
                     <a:srgbClr val="000000"/>
                   </a:solidFill>
@@ -20530,7 +20540,7 @@
             </a:ln>
             <a:extLst>
               <a:ext uri="{91240B29-F687-4f45-9708-019B960494DF}">
-                <a14:hiddenLine xmlns="" xmlns:a16="http://schemas.microsoft.com/office/drawing/2014/main" xmlns:a14="http://schemas.microsoft.com/office/drawing/2010/main" w="9525">
+                <a14:hiddenLine xmlns:a14="http://schemas.microsoft.com/office/drawing/2010/main" xmlns:a16="http://schemas.microsoft.com/office/drawing/2014/main" xmlns="" w="9525">
                   <a:solidFill>
                     <a:srgbClr val="000000"/>
                   </a:solidFill>
@@ -20601,7 +20611,7 @@
             </a:ln>
             <a:extLst>
               <a:ext uri="{91240B29-F687-4f45-9708-019B960494DF}">
-                <a14:hiddenLine xmlns="" xmlns:a16="http://schemas.microsoft.com/office/drawing/2014/main" xmlns:a14="http://schemas.microsoft.com/office/drawing/2010/main" w="9525">
+                <a14:hiddenLine xmlns:a14="http://schemas.microsoft.com/office/drawing/2010/main" xmlns:a16="http://schemas.microsoft.com/office/drawing/2014/main" xmlns="" w="9525">
                   <a:solidFill>
                     <a:srgbClr val="000000"/>
                   </a:solidFill>
@@ -20706,7 +20716,7 @@
             </a:ln>
             <a:extLst>
               <a:ext uri="{91240B29-F687-4f45-9708-019B960494DF}">
-                <a14:hiddenLine xmlns="" xmlns:a16="http://schemas.microsoft.com/office/drawing/2014/main" xmlns:a14="http://schemas.microsoft.com/office/drawing/2010/main" w="9525">
+                <a14:hiddenLine xmlns:a14="http://schemas.microsoft.com/office/drawing/2010/main" xmlns:a16="http://schemas.microsoft.com/office/drawing/2014/main" xmlns="" w="9525">
                   <a:solidFill>
                     <a:srgbClr val="000000"/>
                   </a:solidFill>
@@ -20789,7 +20799,7 @@
             </a:ln>
             <a:extLst>
               <a:ext uri="{91240B29-F687-4f45-9708-019B960494DF}">
-                <a14:hiddenLine xmlns="" xmlns:a16="http://schemas.microsoft.com/office/drawing/2014/main" xmlns:a14="http://schemas.microsoft.com/office/drawing/2010/main" w="9525">
+                <a14:hiddenLine xmlns:a14="http://schemas.microsoft.com/office/drawing/2010/main" xmlns:a16="http://schemas.microsoft.com/office/drawing/2014/main" xmlns="" w="9525">
                   <a:solidFill>
                     <a:srgbClr val="000000"/>
                   </a:solidFill>
@@ -20894,7 +20904,7 @@
             </a:ln>
             <a:extLst>
               <a:ext uri="{91240B29-F687-4f45-9708-019B960494DF}">
-                <a14:hiddenLine xmlns="" xmlns:a16="http://schemas.microsoft.com/office/drawing/2014/main" xmlns:a14="http://schemas.microsoft.com/office/drawing/2010/main" w="9525">
+                <a14:hiddenLine xmlns:a14="http://schemas.microsoft.com/office/drawing/2010/main" xmlns:a16="http://schemas.microsoft.com/office/drawing/2014/main" xmlns="" w="9525">
                   <a:solidFill>
                     <a:srgbClr val="000000"/>
                   </a:solidFill>
@@ -20977,7 +20987,7 @@
             </a:ln>
             <a:extLst>
               <a:ext uri="{91240B29-F687-4f45-9708-019B960494DF}">
-                <a14:hiddenLine xmlns="" xmlns:a16="http://schemas.microsoft.com/office/drawing/2014/main" xmlns:a14="http://schemas.microsoft.com/office/drawing/2010/main" w="9525">
+                <a14:hiddenLine xmlns:a14="http://schemas.microsoft.com/office/drawing/2010/main" xmlns:a16="http://schemas.microsoft.com/office/drawing/2014/main" xmlns="" w="9525">
                   <a:solidFill>
                     <a:srgbClr val="000000"/>
                   </a:solidFill>
@@ -21082,7 +21092,7 @@
             </a:ln>
             <a:extLst>
               <a:ext uri="{91240B29-F687-4f45-9708-019B960494DF}">
-                <a14:hiddenLine xmlns="" xmlns:a16="http://schemas.microsoft.com/office/drawing/2014/main" xmlns:a14="http://schemas.microsoft.com/office/drawing/2010/main" w="9525">
+                <a14:hiddenLine xmlns:a14="http://schemas.microsoft.com/office/drawing/2010/main" xmlns:a16="http://schemas.microsoft.com/office/drawing/2014/main" xmlns="" w="9525">
                   <a:solidFill>
                     <a:srgbClr val="000000"/>
                   </a:solidFill>
@@ -21131,7 +21141,7 @@
             </a:ln>
             <a:extLst>
               <a:ext uri="{91240B29-F687-4f45-9708-019B960494DF}">
-                <a14:hiddenLine xmlns="" xmlns:a16="http://schemas.microsoft.com/office/drawing/2014/main" xmlns:a14="http://schemas.microsoft.com/office/drawing/2010/main" w="9525">
+                <a14:hiddenLine xmlns:a14="http://schemas.microsoft.com/office/drawing/2010/main" xmlns:a16="http://schemas.microsoft.com/office/drawing/2014/main" xmlns="" w="9525">
                   <a:solidFill>
                     <a:srgbClr val="000000"/>
                   </a:solidFill>
@@ -21236,7 +21246,7 @@
             </a:ln>
             <a:extLst>
               <a:ext uri="{91240B29-F687-4f45-9708-019B960494DF}">
-                <a14:hiddenLine xmlns="" xmlns:a16="http://schemas.microsoft.com/office/drawing/2014/main" xmlns:a14="http://schemas.microsoft.com/office/drawing/2010/main" w="9525">
+                <a14:hiddenLine xmlns:a14="http://schemas.microsoft.com/office/drawing/2010/main" xmlns:a16="http://schemas.microsoft.com/office/drawing/2014/main" xmlns="" w="9525">
                   <a:solidFill>
                     <a:srgbClr val="000000"/>
                   </a:solidFill>
@@ -21313,7 +21323,7 @@
             </a:ln>
             <a:extLst>
               <a:ext uri="{91240B29-F687-4f45-9708-019B960494DF}">
-                <a14:hiddenLine xmlns="" xmlns:a16="http://schemas.microsoft.com/office/drawing/2014/main" xmlns:a14="http://schemas.microsoft.com/office/drawing/2010/main" w="9525">
+                <a14:hiddenLine xmlns:a14="http://schemas.microsoft.com/office/drawing/2010/main" xmlns:a16="http://schemas.microsoft.com/office/drawing/2014/main" xmlns="" w="9525">
                   <a:solidFill>
                     <a:srgbClr val="000000"/>
                   </a:solidFill>
@@ -21390,7 +21400,7 @@
             </a:ln>
             <a:extLst>
               <a:ext uri="{91240B29-F687-4f45-9708-019B960494DF}">
-                <a14:hiddenLine xmlns="" xmlns:a16="http://schemas.microsoft.com/office/drawing/2014/main" xmlns:a14="http://schemas.microsoft.com/office/drawing/2010/main" w="9525">
+                <a14:hiddenLine xmlns:a14="http://schemas.microsoft.com/office/drawing/2010/main" xmlns:a16="http://schemas.microsoft.com/office/drawing/2014/main" xmlns="" w="9525">
                   <a:solidFill>
                     <a:srgbClr val="000000"/>
                   </a:solidFill>
@@ -21495,7 +21505,7 @@
             </a:ln>
             <a:extLst>
               <a:ext uri="{91240B29-F687-4f45-9708-019B960494DF}">
-                <a14:hiddenLine xmlns="" xmlns:a16="http://schemas.microsoft.com/office/drawing/2014/main" xmlns:a14="http://schemas.microsoft.com/office/drawing/2010/main" w="9525">
+                <a14:hiddenLine xmlns:a14="http://schemas.microsoft.com/office/drawing/2010/main" xmlns:a16="http://schemas.microsoft.com/office/drawing/2014/main" xmlns="" w="9525">
                   <a:solidFill>
                     <a:srgbClr val="000000"/>
                   </a:solidFill>
@@ -21578,7 +21588,7 @@
             </a:ln>
             <a:extLst>
               <a:ext uri="{91240B29-F687-4f45-9708-019B960494DF}">
-                <a14:hiddenLine xmlns="" xmlns:a16="http://schemas.microsoft.com/office/drawing/2014/main" xmlns:a14="http://schemas.microsoft.com/office/drawing/2010/main" w="9525">
+                <a14:hiddenLine xmlns:a14="http://schemas.microsoft.com/office/drawing/2010/main" xmlns:a16="http://schemas.microsoft.com/office/drawing/2014/main" xmlns="" w="9525">
                   <a:solidFill>
                     <a:srgbClr val="000000"/>
                   </a:solidFill>
@@ -21655,7 +21665,7 @@
             </a:ln>
             <a:extLst>
               <a:ext uri="{91240B29-F687-4f45-9708-019B960494DF}">
-                <a14:hiddenLine xmlns="" xmlns:a16="http://schemas.microsoft.com/office/drawing/2014/main" xmlns:a14="http://schemas.microsoft.com/office/drawing/2010/main" w="9525">
+                <a14:hiddenLine xmlns:a14="http://schemas.microsoft.com/office/drawing/2010/main" xmlns:a16="http://schemas.microsoft.com/office/drawing/2014/main" xmlns="" w="9525">
                   <a:solidFill>
                     <a:srgbClr val="000000"/>
                   </a:solidFill>
@@ -21760,7 +21770,7 @@
             </a:ln>
             <a:extLst>
               <a:ext uri="{91240B29-F687-4f45-9708-019B960494DF}">
-                <a14:hiddenLine xmlns="" xmlns:a16="http://schemas.microsoft.com/office/drawing/2014/main" xmlns:a14="http://schemas.microsoft.com/office/drawing/2010/main" w="9525">
+                <a14:hiddenLine xmlns:a14="http://schemas.microsoft.com/office/drawing/2010/main" xmlns:a16="http://schemas.microsoft.com/office/drawing/2014/main" xmlns="" w="9525">
                   <a:solidFill>
                     <a:srgbClr val="000000"/>
                   </a:solidFill>
@@ -21837,7 +21847,7 @@
             </a:ln>
             <a:extLst>
               <a:ext uri="{91240B29-F687-4f45-9708-019B960494DF}">
-                <a14:hiddenLine xmlns="" xmlns:a16="http://schemas.microsoft.com/office/drawing/2014/main" xmlns:a14="http://schemas.microsoft.com/office/drawing/2010/main" w="9525">
+                <a14:hiddenLine xmlns:a14="http://schemas.microsoft.com/office/drawing/2010/main" xmlns:a16="http://schemas.microsoft.com/office/drawing/2014/main" xmlns="" w="9525">
                   <a:solidFill>
                     <a:srgbClr val="000000"/>
                   </a:solidFill>
@@ -21942,7 +21952,7 @@
             </a:ln>
             <a:extLst>
               <a:ext uri="{91240B29-F687-4f45-9708-019B960494DF}">
-                <a14:hiddenLine xmlns="" xmlns:a16="http://schemas.microsoft.com/office/drawing/2014/main" xmlns:a14="http://schemas.microsoft.com/office/drawing/2010/main" w="9525">
+                <a14:hiddenLine xmlns:a14="http://schemas.microsoft.com/office/drawing/2010/main" xmlns:a16="http://schemas.microsoft.com/office/drawing/2014/main" xmlns="" w="9525">
                   <a:solidFill>
                     <a:srgbClr val="000000"/>
                   </a:solidFill>
@@ -22019,7 +22029,7 @@
             </a:ln>
             <a:extLst>
               <a:ext uri="{91240B29-F687-4f45-9708-019B960494DF}">
-                <a14:hiddenLine xmlns="" xmlns:a16="http://schemas.microsoft.com/office/drawing/2014/main" xmlns:a14="http://schemas.microsoft.com/office/drawing/2010/main" w="9525">
+                <a14:hiddenLine xmlns:a14="http://schemas.microsoft.com/office/drawing/2010/main" xmlns:a16="http://schemas.microsoft.com/office/drawing/2014/main" xmlns="" w="9525">
                   <a:solidFill>
                     <a:srgbClr val="000000"/>
                   </a:solidFill>
@@ -22124,7 +22134,7 @@
             </a:ln>
             <a:extLst>
               <a:ext uri="{91240B29-F687-4f45-9708-019B960494DF}">
-                <a14:hiddenLine xmlns="" xmlns:a16="http://schemas.microsoft.com/office/drawing/2014/main" xmlns:a14="http://schemas.microsoft.com/office/drawing/2010/main" w="9525">
+                <a14:hiddenLine xmlns:a14="http://schemas.microsoft.com/office/drawing/2010/main" xmlns:a16="http://schemas.microsoft.com/office/drawing/2014/main" xmlns="" w="9525">
                   <a:solidFill>
                     <a:srgbClr val="000000"/>
                   </a:solidFill>
@@ -22173,7 +22183,7 @@
             </a:ln>
             <a:extLst>
               <a:ext uri="{91240B29-F687-4f45-9708-019B960494DF}">
-                <a14:hiddenLine xmlns="" xmlns:a16="http://schemas.microsoft.com/office/drawing/2014/main" xmlns:a14="http://schemas.microsoft.com/office/drawing/2010/main" w="9525">
+                <a14:hiddenLine xmlns:a14="http://schemas.microsoft.com/office/drawing/2010/main" xmlns:a16="http://schemas.microsoft.com/office/drawing/2014/main" xmlns="" w="9525">
                   <a:solidFill>
                     <a:srgbClr val="000000"/>
                   </a:solidFill>
@@ -22253,7 +22263,7 @@
             </a:ln>
             <a:extLst>
               <a:ext uri="{91240B29-F687-4f45-9708-019B960494DF}">
-                <a14:hiddenLine xmlns="" xmlns:a16="http://schemas.microsoft.com/office/drawing/2014/main" xmlns:a14="http://schemas.microsoft.com/office/drawing/2010/main" w="9525">
+                <a14:hiddenLine xmlns:a14="http://schemas.microsoft.com/office/drawing/2010/main" xmlns:a16="http://schemas.microsoft.com/office/drawing/2014/main" xmlns="" w="9525">
                   <a:solidFill>
                     <a:srgbClr val="000000"/>
                   </a:solidFill>
@@ -22358,7 +22368,7 @@
             </a:ln>
             <a:extLst>
               <a:ext uri="{91240B29-F687-4f45-9708-019B960494DF}">
-                <a14:hiddenLine xmlns="" xmlns:a16="http://schemas.microsoft.com/office/drawing/2014/main" xmlns:a14="http://schemas.microsoft.com/office/drawing/2010/main" w="9525">
+                <a14:hiddenLine xmlns:a14="http://schemas.microsoft.com/office/drawing/2010/main" xmlns:a16="http://schemas.microsoft.com/office/drawing/2014/main" xmlns="" w="9525">
                   <a:solidFill>
                     <a:srgbClr val="000000"/>
                   </a:solidFill>
@@ -22435,7 +22445,7 @@
             </a:ln>
             <a:extLst>
               <a:ext uri="{91240B29-F687-4f45-9708-019B960494DF}">
-                <a14:hiddenLine xmlns="" xmlns:a16="http://schemas.microsoft.com/office/drawing/2014/main" xmlns:a14="http://schemas.microsoft.com/office/drawing/2010/main" w="9525">
+                <a14:hiddenLine xmlns:a14="http://schemas.microsoft.com/office/drawing/2010/main" xmlns:a16="http://schemas.microsoft.com/office/drawing/2014/main" xmlns="" w="9525">
                   <a:solidFill>
                     <a:srgbClr val="000000"/>
                   </a:solidFill>
@@ -22540,7 +22550,7 @@
             </a:ln>
             <a:extLst>
               <a:ext uri="{91240B29-F687-4f45-9708-019B960494DF}">
-                <a14:hiddenLine xmlns="" xmlns:a16="http://schemas.microsoft.com/office/drawing/2014/main" xmlns:a14="http://schemas.microsoft.com/office/drawing/2010/main" w="9525">
+                <a14:hiddenLine xmlns:a14="http://schemas.microsoft.com/office/drawing/2010/main" xmlns:a16="http://schemas.microsoft.com/office/drawing/2014/main" xmlns="" w="9525">
                   <a:solidFill>
                     <a:srgbClr val="000000"/>
                   </a:solidFill>
@@ -22645,7 +22655,7 @@
             </a:ln>
             <a:extLst>
               <a:ext uri="{91240B29-F687-4f45-9708-019B960494DF}">
-                <a14:hiddenLine xmlns="" xmlns:a16="http://schemas.microsoft.com/office/drawing/2014/main" xmlns:a14="http://schemas.microsoft.com/office/drawing/2010/main" w="9525">
+                <a14:hiddenLine xmlns:a14="http://schemas.microsoft.com/office/drawing/2010/main" xmlns:a16="http://schemas.microsoft.com/office/drawing/2014/main" xmlns="" w="9525">
                   <a:solidFill>
                     <a:srgbClr val="000000"/>
                   </a:solidFill>
@@ -22725,7 +22735,7 @@
             </a:ln>
             <a:extLst>
               <a:ext uri="{91240B29-F687-4f45-9708-019B960494DF}">
-                <a14:hiddenLine xmlns="" xmlns:a16="http://schemas.microsoft.com/office/drawing/2014/main" xmlns:a14="http://schemas.microsoft.com/office/drawing/2010/main" w="9525">
+                <a14:hiddenLine xmlns:a14="http://schemas.microsoft.com/office/drawing/2010/main" xmlns:a16="http://schemas.microsoft.com/office/drawing/2014/main" xmlns="" w="9525">
                   <a:solidFill>
                     <a:srgbClr val="000000"/>
                   </a:solidFill>
@@ -22802,7 +22812,7 @@
             </a:ln>
             <a:extLst>
               <a:ext uri="{91240B29-F687-4f45-9708-019B960494DF}">
-                <a14:hiddenLine xmlns="" xmlns:a16="http://schemas.microsoft.com/office/drawing/2014/main" xmlns:a14="http://schemas.microsoft.com/office/drawing/2010/main" w="9525">
+                <a14:hiddenLine xmlns:a14="http://schemas.microsoft.com/office/drawing/2010/main" xmlns:a16="http://schemas.microsoft.com/office/drawing/2014/main" xmlns="" w="9525">
                   <a:solidFill>
                     <a:srgbClr val="000000"/>
                   </a:solidFill>
@@ -22907,7 +22917,7 @@
             </a:ln>
             <a:extLst>
               <a:ext uri="{91240B29-F687-4f45-9708-019B960494DF}">
-                <a14:hiddenLine xmlns="" xmlns:a16="http://schemas.microsoft.com/office/drawing/2014/main" xmlns:a14="http://schemas.microsoft.com/office/drawing/2010/main" w="9525">
+                <a14:hiddenLine xmlns:a14="http://schemas.microsoft.com/office/drawing/2010/main" xmlns:a16="http://schemas.microsoft.com/office/drawing/2014/main" xmlns="" w="9525">
                   <a:solidFill>
                     <a:srgbClr val="000000"/>
                   </a:solidFill>
@@ -23012,7 +23022,7 @@
             </a:ln>
             <a:extLst>
               <a:ext uri="{91240B29-F687-4f45-9708-019B960494DF}">
-                <a14:hiddenLine xmlns="" xmlns:a16="http://schemas.microsoft.com/office/drawing/2014/main" xmlns:a14="http://schemas.microsoft.com/office/drawing/2010/main" w="9525">
+                <a14:hiddenLine xmlns:a14="http://schemas.microsoft.com/office/drawing/2010/main" xmlns:a16="http://schemas.microsoft.com/office/drawing/2014/main" xmlns="" w="9525">
                   <a:solidFill>
                     <a:srgbClr val="000000"/>
                   </a:solidFill>
@@ -23089,7 +23099,7 @@
             </a:ln>
             <a:extLst>
               <a:ext uri="{91240B29-F687-4f45-9708-019B960494DF}">
-                <a14:hiddenLine xmlns="" xmlns:a16="http://schemas.microsoft.com/office/drawing/2014/main" xmlns:a14="http://schemas.microsoft.com/office/drawing/2010/main" w="9525">
+                <a14:hiddenLine xmlns:a14="http://schemas.microsoft.com/office/drawing/2010/main" xmlns:a16="http://schemas.microsoft.com/office/drawing/2014/main" xmlns="" w="9525">
                   <a:solidFill>
                     <a:srgbClr val="000000"/>
                   </a:solidFill>
@@ -23224,7 +23234,7 @@
             </a:ln>
             <a:extLst>
               <a:ext uri="{91240B29-F687-4f45-9708-019B960494DF}">
-                <a14:hiddenLine xmlns="" xmlns:a16="http://schemas.microsoft.com/office/drawing/2014/main" xmlns:a14="http://schemas.microsoft.com/office/drawing/2010/main" w="9525">
+                <a14:hiddenLine xmlns:a14="http://schemas.microsoft.com/office/drawing/2010/main" xmlns:a16="http://schemas.microsoft.com/office/drawing/2014/main" xmlns="" w="9525">
                   <a:solidFill>
                     <a:srgbClr val="000000"/>
                   </a:solidFill>
@@ -23307,7 +23317,7 @@
             </a:ln>
             <a:extLst>
               <a:ext uri="{91240B29-F687-4f45-9708-019B960494DF}">
-                <a14:hiddenLine xmlns="" xmlns:a16="http://schemas.microsoft.com/office/drawing/2014/main" xmlns:a14="http://schemas.microsoft.com/office/drawing/2010/main" w="9525">
+                <a14:hiddenLine xmlns:a14="http://schemas.microsoft.com/office/drawing/2010/main" xmlns:a16="http://schemas.microsoft.com/office/drawing/2014/main" xmlns="" w="9525">
                   <a:solidFill>
                     <a:srgbClr val="000000"/>
                   </a:solidFill>
@@ -23412,7 +23422,7 @@
             </a:ln>
             <a:extLst>
               <a:ext uri="{91240B29-F687-4f45-9708-019B960494DF}">
-                <a14:hiddenLine xmlns="" xmlns:a16="http://schemas.microsoft.com/office/drawing/2014/main" xmlns:a14="http://schemas.microsoft.com/office/drawing/2010/main" w="9525">
+                <a14:hiddenLine xmlns:a14="http://schemas.microsoft.com/office/drawing/2010/main" xmlns:a16="http://schemas.microsoft.com/office/drawing/2014/main" xmlns="" w="9525">
                   <a:solidFill>
                     <a:srgbClr val="000000"/>
                   </a:solidFill>
@@ -23569,7 +23579,7 @@
             <a:noFill/>
             <a:extLst>
               <a:ext uri="{909E8E84-426E-40dd-AFC4-6F175D3DCCD1}">
-                <a14:hiddenFill xmlns="" xmlns:a16="http://schemas.microsoft.com/office/drawing/2014/main" xmlns:p14="http://schemas.microsoft.com/office/powerpoint/2010/main" xmlns:a14="http://schemas.microsoft.com/office/drawing/2010/main">
+                <a14:hiddenFill xmlns:a14="http://schemas.microsoft.com/office/drawing/2010/main" xmlns:p14="http://schemas.microsoft.com/office/powerpoint/2010/main" xmlns:a16="http://schemas.microsoft.com/office/drawing/2014/main" xmlns="">
                   <a:solidFill>
                     <a:srgbClr val="FFFFFF"/>
                   </a:solidFill>

</xml_diff>